<commit_message>
change 2 hyperparameters to 1, keep looking for shoulder maximum strength
Signed-off-by: Albert <wensinlor@gmail.com>
</commit_message>
<xml_diff>
--- a/URECA_Poster_v1.pptx
+++ b/URECA_Poster_v1.pptx
@@ -350,7 +350,7 @@
               <a:pPr>
                 <a:defRPr/>
               </a:pPr>
-              <a:t>3/3/2023</a:t>
+              <a:t>9/3/2023</a:t>
             </a:fld>
             <a:endParaRPr lang="en-SG"/>
           </a:p>
@@ -565,7 +565,7 @@
               <a:pPr>
                 <a:defRPr/>
               </a:pPr>
-              <a:t>3/3/2023</a:t>
+              <a:t>9/3/2023</a:t>
             </a:fld>
             <a:endParaRPr lang="en-SG"/>
           </a:p>
@@ -790,7 +790,7 @@
               <a:pPr>
                 <a:defRPr/>
               </a:pPr>
-              <a:t>3/3/2023</a:t>
+              <a:t>9/3/2023</a:t>
             </a:fld>
             <a:endParaRPr lang="en-SG"/>
           </a:p>
@@ -1005,7 +1005,7 @@
               <a:pPr>
                 <a:defRPr/>
               </a:pPr>
-              <a:t>3/3/2023</a:t>
+              <a:t>9/3/2023</a:t>
             </a:fld>
             <a:endParaRPr lang="en-SG"/>
           </a:p>
@@ -1296,7 +1296,7 @@
               <a:pPr>
                 <a:defRPr/>
               </a:pPr>
-              <a:t>3/3/2023</a:t>
+              <a:t>9/3/2023</a:t>
             </a:fld>
             <a:endParaRPr lang="en-SG"/>
           </a:p>
@@ -1629,7 +1629,7 @@
               <a:pPr>
                 <a:defRPr/>
               </a:pPr>
-              <a:t>3/3/2023</a:t>
+              <a:t>9/3/2023</a:t>
             </a:fld>
             <a:endParaRPr lang="en-SG"/>
           </a:p>
@@ -2096,7 +2096,7 @@
               <a:pPr>
                 <a:defRPr/>
               </a:pPr>
-              <a:t>3/3/2023</a:t>
+              <a:t>9/3/2023</a:t>
             </a:fld>
             <a:endParaRPr lang="en-SG"/>
           </a:p>
@@ -2259,7 +2259,7 @@
               <a:pPr>
                 <a:defRPr/>
               </a:pPr>
-              <a:t>3/3/2023</a:t>
+              <a:t>9/3/2023</a:t>
             </a:fld>
             <a:endParaRPr lang="en-SG"/>
           </a:p>
@@ -2399,7 +2399,7 @@
               <a:pPr>
                 <a:defRPr/>
               </a:pPr>
-              <a:t>3/3/2023</a:t>
+              <a:t>9/3/2023</a:t>
             </a:fld>
             <a:endParaRPr lang="en-SG"/>
           </a:p>
@@ -2721,7 +2721,7 @@
               <a:pPr>
                 <a:defRPr/>
               </a:pPr>
-              <a:t>3/3/2023</a:t>
+              <a:t>9/3/2023</a:t>
             </a:fld>
             <a:endParaRPr lang="en-SG"/>
           </a:p>
@@ -3022,7 +3022,7 @@
               <a:pPr>
                 <a:defRPr/>
               </a:pPr>
-              <a:t>3/3/2023</a:t>
+              <a:t>9/3/2023</a:t>
             </a:fld>
             <a:endParaRPr lang="en-SG"/>
           </a:p>
@@ -3349,7 +3349,7 @@
               <a:pPr>
                 <a:defRPr/>
               </a:pPr>
-              <a:t>3/3/2023</a:t>
+              <a:t>9/3/2023</a:t>
             </a:fld>
             <a:endParaRPr lang="en-SG"/>
           </a:p>
@@ -4493,7 +4493,7 @@
                 <a:latin typeface="Arial" panose="020B0604020202020204" pitchFamily="34" charset="0"/>
                 <a:cs typeface="Arial" panose="020B0604020202020204" pitchFamily="34" charset="0"/>
               </a:rPr>
-              <a:t>Presented by Lor Wen Sin</a:t>
+              <a:t>Presented by Lor Wen Sin (MAE)</a:t>
             </a:r>
           </a:p>
           <a:p>
@@ -4513,8 +4513,25 @@
                 <a:latin typeface="Arial" panose="020B0604020202020204" pitchFamily="34" charset="0"/>
                 <a:cs typeface="Arial" panose="020B0604020202020204" pitchFamily="34" charset="0"/>
               </a:rPr>
-              <a:t>Supervised by Asst Prof Kim Jinwoo</a:t>
-            </a:r>
+              <a:t>Supervised by Asst Prof </a:t>
+            </a:r>
+            <a:r>
+              <a:rPr lang="en-US" altLang="en-US" sz="4000" b="1">
+                <a:solidFill>
+                  <a:schemeClr val="tx2"/>
+                </a:solidFill>
+                <a:latin typeface="Arial" panose="020B0604020202020204" pitchFamily="34" charset="0"/>
+                <a:cs typeface="Arial" panose="020B0604020202020204" pitchFamily="34" charset="0"/>
+              </a:rPr>
+              <a:t>Kim Jinwoo (CEE)</a:t>
+            </a:r>
+            <a:endParaRPr lang="en-US" altLang="en-US" sz="4000" b="1" dirty="0">
+              <a:solidFill>
+                <a:schemeClr val="tx2"/>
+              </a:solidFill>
+              <a:latin typeface="Arial" panose="020B0604020202020204" pitchFamily="34" charset="0"/>
+              <a:cs typeface="Arial" panose="020B0604020202020204" pitchFamily="34" charset="0"/>
+            </a:endParaRPr>
           </a:p>
           <a:p>
             <a:pPr defTabSz="2952323" eaLnBrk="1" fontAlgn="auto" hangingPunct="1">
@@ -4815,8 +4832,8 @@
         </p:blipFill>
         <p:spPr>
           <a:xfrm>
-            <a:off x="373896" y="5616582"/>
-            <a:ext cx="667582" cy="667582"/>
+            <a:off x="515674" y="5616582"/>
+            <a:ext cx="600662" cy="600662"/>
           </a:xfrm>
           <a:prstGeom prst="rect">
             <a:avLst/>
@@ -4837,8 +4854,8 @@
         </p:nvSpPr>
         <p:spPr>
           <a:xfrm>
-            <a:off x="1260352" y="5668433"/>
-            <a:ext cx="2808312" cy="615732"/>
+            <a:off x="1188344" y="5668433"/>
+            <a:ext cx="2376264" cy="615732"/>
           </a:xfrm>
           <a:prstGeom prst="rect">
             <a:avLst/>
@@ -4866,7 +4883,7 @@
               </a:spcAft>
             </a:pPr>
             <a:r>
-              <a:rPr lang="en-MY" sz="3200" b="1" dirty="0">
+              <a:rPr lang="en-MY" sz="2800" b="1" dirty="0">
                 <a:effectLst/>
                 <a:latin typeface="Arial" panose="020B0604020202020204" pitchFamily="34" charset="0"/>
                 <a:ea typeface="DengXian" panose="02010600030101010101" pitchFamily="2" charset="-122"/>
@@ -4874,7 +4891,7 @@
               </a:rPr>
               <a:t>Background</a:t>
             </a:r>
-            <a:endParaRPr lang="en-US" sz="3200" dirty="0">
+            <a:endParaRPr lang="en-US" sz="2800" dirty="0">
               <a:effectLst/>
               <a:latin typeface="Arial" panose="020B0604020202020204" pitchFamily="34" charset="0"/>
               <a:ea typeface="DengXian" panose="02010600030101010101" pitchFamily="2" charset="-122"/>
@@ -4897,8 +4914,8 @@
         </p:nvSpPr>
         <p:spPr>
           <a:xfrm>
-            <a:off x="707687" y="6679243"/>
-            <a:ext cx="20471150" cy="3539430"/>
+            <a:off x="678591" y="6510623"/>
+            <a:ext cx="20471150" cy="4955203"/>
           </a:xfrm>
           <a:prstGeom prst="rect">
             <a:avLst/>
@@ -4912,27 +4929,69 @@
           <a:lstStyle/>
           <a:p>
             <a:r>
+              <a:rPr lang="en-US" sz="2400" dirty="0">
+                <a:latin typeface="Arial" panose="020B0604020202020204" pitchFamily="34" charset="0"/>
+                <a:cs typeface="Arial" panose="020B0604020202020204" pitchFamily="34" charset="0"/>
+              </a:rPr>
+              <a:t>Ensuring worker safety is our top priority on construction sites. However, the assessment of ergonomic risks such as working posture and duration is often incomplete. The consideration of cumulative damage is critical in estimating ergonomic risk, yet leading assessments such as REBA and RULA do not account for this factor</a:t>
+            </a:r>
+            <a:r>
+              <a:rPr lang="en-MY" sz="2400" dirty="0">
+                <a:latin typeface="Arial" panose="020B0604020202020204" pitchFamily="34" charset="0"/>
+                <a:cs typeface="Arial" panose="020B0604020202020204" pitchFamily="34" charset="0"/>
+              </a:rPr>
+              <a:t>. (see Table 1)</a:t>
+            </a:r>
+          </a:p>
+          <a:p>
+            <a:br>
               <a:rPr lang="en-MY" sz="2800" dirty="0">
                 <a:latin typeface="Arial" panose="020B0604020202020204" pitchFamily="34" charset="0"/>
                 <a:cs typeface="Arial" panose="020B0604020202020204" pitchFamily="34" charset="0"/>
               </a:rPr>
-              <a:t>Workers’ safety is always our main concern in construction site. However, ergonomic risk such as working posture and time are usually not taken into account comprehensively in risk assessment. The concept of cumulative damage is essential when estimating the ergonomic risk, however, current famous ergonomic risk assessments such as REBA and RULA do not take cumulative damage into account. </a:t>
-            </a:r>
-          </a:p>
-          <a:p>
-            <a:r>
-              <a:rPr lang="en-MY" sz="2800" dirty="0">
+            </a:br>
+            <a:endParaRPr lang="en-MY" sz="2800" dirty="0">
+              <a:latin typeface="Arial" panose="020B0604020202020204" pitchFamily="34" charset="0"/>
+              <a:cs typeface="Arial" panose="020B0604020202020204" pitchFamily="34" charset="0"/>
+            </a:endParaRPr>
+          </a:p>
+          <a:p>
+            <a:endParaRPr lang="en-MY" sz="2800" dirty="0">
+              <a:latin typeface="Arial" panose="020B0604020202020204" pitchFamily="34" charset="0"/>
+              <a:cs typeface="Arial" panose="020B0604020202020204" pitchFamily="34" charset="0"/>
+            </a:endParaRPr>
+          </a:p>
+          <a:p>
+            <a:endParaRPr lang="en-MY" sz="2800" dirty="0">
+              <a:latin typeface="Arial" panose="020B0604020202020204" pitchFamily="34" charset="0"/>
+              <a:cs typeface="Arial" panose="020B0604020202020204" pitchFamily="34" charset="0"/>
+            </a:endParaRPr>
+          </a:p>
+          <a:p>
+            <a:endParaRPr lang="en-MY" sz="2800" dirty="0">
+              <a:latin typeface="Arial" panose="020B0604020202020204" pitchFamily="34" charset="0"/>
+              <a:cs typeface="Arial" panose="020B0604020202020204" pitchFamily="34" charset="0"/>
+            </a:endParaRPr>
+          </a:p>
+          <a:p>
+            <a:endParaRPr lang="en-MY" sz="2800" dirty="0">
+              <a:latin typeface="Arial" panose="020B0604020202020204" pitchFamily="34" charset="0"/>
+              <a:cs typeface="Arial" panose="020B0604020202020204" pitchFamily="34" charset="0"/>
+            </a:endParaRPr>
+          </a:p>
+          <a:p>
+            <a:endParaRPr lang="en-US" sz="2800" dirty="0">
+              <a:latin typeface="Arial" panose="020B0604020202020204" pitchFamily="34" charset="0"/>
+              <a:cs typeface="Arial" panose="020B0604020202020204" pitchFamily="34" charset="0"/>
+            </a:endParaRPr>
+          </a:p>
+          <a:p>
+            <a:r>
+              <a:rPr lang="en-US" sz="2400" dirty="0">
                 <a:latin typeface="Arial" panose="020B0604020202020204" pitchFamily="34" charset="0"/>
                 <a:cs typeface="Arial" panose="020B0604020202020204" pitchFamily="34" charset="0"/>
               </a:rPr>
-              <a:t>Secondly, current posture data collections are relying wearables such as IMU, which causes inconvenience and </a:t>
-            </a:r>
-            <a:r>
-              <a:rPr lang="en-US" sz="2800" dirty="0">
-                <a:latin typeface="Arial" panose="020B0604020202020204" pitchFamily="34" charset="0"/>
-                <a:cs typeface="Arial" panose="020B0604020202020204" pitchFamily="34" charset="0"/>
-              </a:rPr>
-              <a:t>discomfort to the workers. Hence, our research is trying to:</a:t>
+              <a:t>To improve worker comfort and convenience during posture data collection, our research has two objectives:</a:t>
             </a:r>
           </a:p>
           <a:p>
@@ -4941,12 +5000,16 @@
               <a:buAutoNum type="arabicPeriod"/>
             </a:pPr>
             <a:r>
-              <a:rPr lang="en-MY" sz="2800" i="1" dirty="0">
+              <a:rPr lang="en-US" sz="2400" i="1" dirty="0">
                 <a:latin typeface="Arial" panose="020B0604020202020204" pitchFamily="34" charset="0"/>
                 <a:cs typeface="Arial" panose="020B0604020202020204" pitchFamily="34" charset="0"/>
               </a:rPr>
-              <a:t>Estimate the risk possibility of getting injured using ergonomic cumulative damage assessment based on the working behaviour of the workers. </a:t>
-            </a:r>
+              <a:t>Understand the relationship between the workers’ working behavior and the injury risk probability.</a:t>
+            </a:r>
+            <a:endParaRPr lang="en-MY" sz="2800" dirty="0">
+              <a:latin typeface="Arial" panose="020B0604020202020204" pitchFamily="34" charset="0"/>
+              <a:cs typeface="Arial" panose="020B0604020202020204" pitchFamily="34" charset="0"/>
+            </a:endParaRPr>
           </a:p>
         </p:txBody>
       </p:sp>
@@ -4965,14 +5028,14 @@
           <p:nvPr>
             <p:extLst>
               <p:ext uri="{D42A27DB-BD31-4B8C-83A1-F6EECF244321}">
-                <p14:modId xmlns:p14="http://schemas.microsoft.com/office/powerpoint/2010/main" val="2186941323"/>
+                <p14:modId xmlns:p14="http://schemas.microsoft.com/office/powerpoint/2010/main" val="3124958384"/>
               </p:ext>
             </p:extLst>
           </p:nvPr>
         </p:nvGraphicFramePr>
         <p:xfrm>
-          <a:off x="759490" y="10321899"/>
-          <a:ext cx="13396338" cy="2895600"/>
+          <a:off x="5243844" y="7772388"/>
+          <a:ext cx="11642394" cy="2471055"/>
         </p:xfrm>
         <a:graphic>
           <a:graphicData uri="http://schemas.openxmlformats.org/drawingml/2006/table">
@@ -4981,14 +5044,14 @@
                 <a:tableStyleId>{5C22544A-7EE6-4342-B048-85BDC9FD1C3A}</a:tableStyleId>
               </a:tblPr>
               <a:tblGrid>
-                <a:gridCol w="6698169">
+                <a:gridCol w="5821197">
                   <a:extLst>
                     <a:ext uri="{9D8B030D-6E8A-4147-A177-3AD203B41FA5}">
                       <a16:colId xmlns:a16="http://schemas.microsoft.com/office/drawing/2014/main" val="4189438353"/>
                     </a:ext>
                   </a:extLst>
                 </a:gridCol>
-                <a:gridCol w="6698169">
+                <a:gridCol w="5821197">
                   <a:extLst>
                     <a:ext uri="{9D8B030D-6E8A-4147-A177-3AD203B41FA5}">
                       <a16:colId xmlns:a16="http://schemas.microsoft.com/office/drawing/2014/main" val="2275240683"/>
@@ -4996,7 +5059,7 @@
                   </a:extLst>
                 </a:gridCol>
               </a:tblGrid>
-              <a:tr h="370840">
+              <a:tr h="494211">
                 <a:tc>
                   <a:txBody>
                     <a:bodyPr/>
@@ -5004,21 +5067,21 @@
                     <a:p>
                       <a:pPr algn="ctr"/>
                       <a:r>
-                        <a:rPr lang="en-MY" sz="3200" dirty="0">
+                        <a:rPr lang="en-MY" sz="2400" dirty="0">
                           <a:solidFill>
                             <a:schemeClr val="tx1"/>
                           </a:solidFill>
                         </a:rPr>
                         <a:t>REBA/ RULA</a:t>
                       </a:r>
-                      <a:endParaRPr lang="en-US" sz="3200" dirty="0">
+                      <a:endParaRPr lang="en-US" sz="2400" dirty="0">
                         <a:solidFill>
                           <a:schemeClr val="tx1"/>
                         </a:solidFill>
                       </a:endParaRPr>
                     </a:p>
                   </a:txBody>
-                  <a:tcPr/>
+                  <a:tcPr marL="77862" marR="77862" marT="38930" marB="38930"/>
                 </a:tc>
                 <a:tc>
                   <a:txBody>
@@ -5027,21 +5090,21 @@
                     <a:p>
                       <a:pPr algn="ctr"/>
                       <a:r>
-                        <a:rPr lang="en-MY" sz="3200" dirty="0">
+                        <a:rPr lang="en-MY" sz="2400" dirty="0">
                           <a:solidFill>
                             <a:schemeClr val="tx1"/>
                           </a:solidFill>
                         </a:rPr>
                         <a:t>Our Method</a:t>
                       </a:r>
-                      <a:endParaRPr lang="en-US" sz="3200" dirty="0">
+                      <a:endParaRPr lang="en-US" sz="2400" dirty="0">
                         <a:solidFill>
                           <a:schemeClr val="tx1"/>
                         </a:solidFill>
                       </a:endParaRPr>
                     </a:p>
                   </a:txBody>
-                  <a:tcPr/>
+                  <a:tcPr marL="77862" marR="77862" marT="38930" marB="38930"/>
                 </a:tc>
                 <a:extLst>
                   <a:ext uri="{0D108BD9-81ED-4DB2-BD59-A6C34878D82A}">
@@ -5049,7 +5112,7 @@
                   </a:ext>
                 </a:extLst>
               </a:tr>
-              <a:tr h="370840">
+              <a:tr h="494211">
                 <a:tc>
                   <a:txBody>
                     <a:bodyPr/>
@@ -5057,21 +5120,21 @@
                     <a:p>
                       <a:pPr algn="ctr"/>
                       <a:r>
-                        <a:rPr lang="en-MY" sz="3200" dirty="0">
+                        <a:rPr lang="en-MY" sz="2400" dirty="0">
                           <a:solidFill>
                             <a:schemeClr val="tx1"/>
                           </a:solidFill>
                         </a:rPr>
                         <a:t>Assess Risk Score for Each Activity</a:t>
                       </a:r>
-                      <a:endParaRPr lang="en-US" sz="3200" dirty="0">
+                      <a:endParaRPr lang="en-US" sz="2400" dirty="0">
                         <a:solidFill>
                           <a:schemeClr val="tx1"/>
                         </a:solidFill>
                       </a:endParaRPr>
                     </a:p>
                   </a:txBody>
-                  <a:tcPr/>
+                  <a:tcPr marL="77862" marR="77862" marT="38930" marB="38930"/>
                 </a:tc>
                 <a:tc>
                   <a:txBody>
@@ -5080,21 +5143,21 @@
                     <a:p>
                       <a:pPr algn="ctr"/>
                       <a:r>
-                        <a:rPr lang="en-MY" sz="3200" dirty="0">
+                        <a:rPr lang="en-MY" sz="2400" dirty="0">
                           <a:solidFill>
                             <a:schemeClr val="tx1"/>
                           </a:solidFill>
                         </a:rPr>
                         <a:t>Assess Risk % for Each Repetition</a:t>
                       </a:r>
-                      <a:endParaRPr lang="en-US" sz="3200" dirty="0">
+                      <a:endParaRPr lang="en-US" sz="2400" dirty="0">
                         <a:solidFill>
                           <a:schemeClr val="tx1"/>
                         </a:solidFill>
                       </a:endParaRPr>
                     </a:p>
                   </a:txBody>
-                  <a:tcPr/>
+                  <a:tcPr marL="77862" marR="77862" marT="38930" marB="38930"/>
                 </a:tc>
                 <a:extLst>
                   <a:ext uri="{0D108BD9-81ED-4DB2-BD59-A6C34878D82A}">
@@ -5102,7 +5165,7 @@
                   </a:ext>
                 </a:extLst>
               </a:tr>
-              <a:tr h="370840">
+              <a:tr h="494211">
                 <a:tc>
                   <a:txBody>
                     <a:bodyPr/>
@@ -5110,7 +5173,7 @@
                     <a:p>
                       <a:pPr algn="ctr"/>
                       <a:r>
-                        <a:rPr lang="en-US" altLang="zh-CN" sz="3200" dirty="0">
+                        <a:rPr lang="en-US" altLang="zh-CN" sz="2400" dirty="0">
                           <a:solidFill>
                             <a:schemeClr val="tx1"/>
                           </a:solidFill>
@@ -5118,21 +5181,21 @@
                         <a:t>Indirect </a:t>
                       </a:r>
                       <a:r>
-                        <a:rPr lang="en-MY" sz="3200" dirty="0">
+                        <a:rPr lang="en-MY" sz="2400" dirty="0">
                           <a:solidFill>
                             <a:schemeClr val="tx1"/>
                           </a:solidFill>
                         </a:rPr>
                         <a:t>Repetition</a:t>
                       </a:r>
-                      <a:endParaRPr lang="en-US" sz="3200" dirty="0">
+                      <a:endParaRPr lang="en-US" sz="2400" dirty="0">
                         <a:solidFill>
                           <a:schemeClr val="tx1"/>
                         </a:solidFill>
                       </a:endParaRPr>
                     </a:p>
                   </a:txBody>
-                  <a:tcPr/>
+                  <a:tcPr marL="77862" marR="77862" marT="38930" marB="38930"/>
                 </a:tc>
                 <a:tc>
                   <a:txBody>
@@ -5141,21 +5204,21 @@
                     <a:p>
                       <a:pPr algn="ctr"/>
                       <a:r>
-                        <a:rPr lang="en-MY" sz="3200" dirty="0">
+                        <a:rPr lang="en-MY" sz="2400" dirty="0">
                           <a:solidFill>
                             <a:schemeClr val="tx1"/>
                           </a:solidFill>
                         </a:rPr>
                         <a:t>Dynamic Damage per Repetition</a:t>
                       </a:r>
-                      <a:endParaRPr lang="en-US" sz="3200" dirty="0">
+                      <a:endParaRPr lang="en-US" sz="2400" dirty="0">
                         <a:solidFill>
                           <a:schemeClr val="tx1"/>
                         </a:solidFill>
                       </a:endParaRPr>
                     </a:p>
                   </a:txBody>
-                  <a:tcPr/>
+                  <a:tcPr marL="77862" marR="77862" marT="38930" marB="38930"/>
                 </a:tc>
                 <a:extLst>
                   <a:ext uri="{0D108BD9-81ED-4DB2-BD59-A6C34878D82A}">
@@ -5163,7 +5226,7 @@
                   </a:ext>
                 </a:extLst>
               </a:tr>
-              <a:tr h="370840">
+              <a:tr h="494211">
                 <a:tc>
                   <a:txBody>
                     <a:bodyPr/>
@@ -5171,7 +5234,7 @@
                     <a:p>
                       <a:pPr algn="ctr"/>
                       <a:r>
-                        <a:rPr lang="en-US" sz="3200" dirty="0">
+                        <a:rPr lang="en-US" sz="2400" dirty="0">
                           <a:solidFill>
                             <a:schemeClr val="tx1"/>
                           </a:solidFill>
@@ -5180,7 +5243,7 @@
                       </a:r>
                     </a:p>
                   </a:txBody>
-                  <a:tcPr/>
+                  <a:tcPr marL="77862" marR="77862" marT="38930" marB="38930"/>
                 </a:tc>
                 <a:tc>
                   <a:txBody>
@@ -5189,7 +5252,7 @@
                     <a:p>
                       <a:pPr algn="ctr"/>
                       <a:r>
-                        <a:rPr lang="en-US" sz="3200" dirty="0">
+                        <a:rPr lang="en-US" sz="2400" dirty="0">
                           <a:solidFill>
                             <a:schemeClr val="tx1"/>
                           </a:solidFill>
@@ -5198,7 +5261,7 @@
                       </a:r>
                     </a:p>
                   </a:txBody>
-                  <a:tcPr/>
+                  <a:tcPr marL="77862" marR="77862" marT="38930" marB="38930"/>
                 </a:tc>
                 <a:extLst>
                   <a:ext uri="{0D108BD9-81ED-4DB2-BD59-A6C34878D82A}">
@@ -5206,7 +5269,7 @@
                   </a:ext>
                 </a:extLst>
               </a:tr>
-              <a:tr h="370840">
+              <a:tr h="494211">
                 <a:tc>
                   <a:txBody>
                     <a:bodyPr/>
@@ -5214,21 +5277,21 @@
                     <a:p>
                       <a:pPr algn="ctr"/>
                       <a:r>
-                        <a:rPr lang="en-MY" sz="3200" dirty="0">
+                        <a:rPr lang="en-MY" sz="2400" dirty="0">
                           <a:solidFill>
                             <a:schemeClr val="tx1"/>
                           </a:solidFill>
                         </a:rPr>
                         <a:t>Only using Risk Score with Range 1 - 7</a:t>
                       </a:r>
-                      <a:endParaRPr lang="en-US" sz="3200" dirty="0">
+                      <a:endParaRPr lang="en-US" sz="2400" dirty="0">
                         <a:solidFill>
                           <a:schemeClr val="tx1"/>
                         </a:solidFill>
                       </a:endParaRPr>
                     </a:p>
                   </a:txBody>
-                  <a:tcPr/>
+                  <a:tcPr marL="77862" marR="77862" marT="38930" marB="38930"/>
                 </a:tc>
                 <a:tc>
                   <a:txBody>
@@ -5237,21 +5300,21 @@
                     <a:p>
                       <a:pPr algn="ctr"/>
                       <a:r>
-                        <a:rPr lang="en-MY" sz="3200" dirty="0">
+                        <a:rPr lang="en-MY" sz="2400" dirty="0">
                           <a:solidFill>
                             <a:schemeClr val="tx1"/>
                           </a:solidFill>
                         </a:rPr>
                         <a:t>Able to Estimate Risk %</a:t>
                       </a:r>
-                      <a:endParaRPr lang="en-US" sz="3200" dirty="0">
+                      <a:endParaRPr lang="en-US" sz="2400" dirty="0">
                         <a:solidFill>
                           <a:schemeClr val="tx1"/>
                         </a:solidFill>
                       </a:endParaRPr>
                     </a:p>
                   </a:txBody>
-                  <a:tcPr/>
+                  <a:tcPr marL="77862" marR="77862" marT="38930" marB="38930"/>
                 </a:tc>
                 <a:extLst>
                   <a:ext uri="{0D108BD9-81ED-4DB2-BD59-A6C34878D82A}">
@@ -5277,8 +5340,8 @@
         </p:nvSpPr>
         <p:spPr>
           <a:xfrm>
-            <a:off x="706791" y="13681824"/>
-            <a:ext cx="20471150" cy="954107"/>
+            <a:off x="707687" y="11467579"/>
+            <a:ext cx="20471150" cy="830997"/>
           </a:xfrm>
           <a:prstGeom prst="rect">
             <a:avLst/>
@@ -5296,31 +5359,3938 @@
               <a:buAutoNum type="arabicPeriod" startAt="2"/>
             </a:pPr>
             <a:r>
-              <a:rPr lang="en-MY" sz="2800" i="1" dirty="0">
+              <a:rPr lang="en-US" sz="2400" i="1" dirty="0">
+                <a:latin typeface="Arial" panose="020B0604020202020204" pitchFamily="34" charset="0"/>
+                <a:cs typeface="Arial" panose="020B0604020202020204" pitchFamily="34" charset="0"/>
+              </a:rPr>
+              <a:t>Understand the reliability of visual AI-enabled pose estimation techniques for ergonomic cumulative damage assessment in comparison to wearable-based techniques like IMU. </a:t>
+            </a:r>
+            <a:endParaRPr lang="en-MY" sz="2400" dirty="0">
+              <a:latin typeface="Arial" panose="020B0604020202020204" pitchFamily="34" charset="0"/>
+              <a:cs typeface="Arial" panose="020B0604020202020204" pitchFamily="34" charset="0"/>
+            </a:endParaRPr>
+          </a:p>
+        </p:txBody>
+      </p:sp>
+      <p:sp>
+        <p:nvSpPr>
+          <p:cNvPr id="9" name="TextBox 8">
+            <a:extLst>
+              <a:ext uri="{FF2B5EF4-FFF2-40B4-BE49-F238E27FC236}">
+                <a16:creationId xmlns:a16="http://schemas.microsoft.com/office/drawing/2014/main" id="{FEB83AAF-94AA-9566-15CE-EA9C284B2CC8}"/>
+              </a:ext>
+            </a:extLst>
+          </p:cNvPr>
+          <p:cNvSpPr txBox="1"/>
+          <p:nvPr/>
+        </p:nvSpPr>
+        <p:spPr>
+          <a:xfrm>
+            <a:off x="10128783" y="10202083"/>
+            <a:ext cx="1872208" cy="430887"/>
+          </a:xfrm>
+          <a:prstGeom prst="rect">
+            <a:avLst/>
+          </a:prstGeom>
+          <a:noFill/>
+        </p:spPr>
+        <p:txBody>
+          <a:bodyPr wrap="square">
+            <a:spAutoFit/>
+          </a:bodyPr>
+          <a:lstStyle/>
+          <a:p>
+            <a:r>
+              <a:rPr lang="en-MY" sz="2200" dirty="0">
+                <a:highlight>
+                  <a:srgbClr val="FFFF00"/>
+                </a:highlight>
+                <a:latin typeface="Arial" panose="020B0604020202020204" pitchFamily="34" charset="0"/>
+                <a:ea typeface="DengXian" panose="02010600030101010101" pitchFamily="2" charset="-122"/>
+                <a:cs typeface="Arial" panose="020B0604020202020204" pitchFamily="34" charset="0"/>
+              </a:rPr>
+              <a:t>Table 1. XXX</a:t>
+            </a:r>
+            <a:endParaRPr lang="en-MY" sz="2200" dirty="0">
+              <a:highlight>
+                <a:srgbClr val="FFFF00"/>
+              </a:highlight>
+              <a:latin typeface="Arial" panose="020B0604020202020204" pitchFamily="34" charset="0"/>
+              <a:cs typeface="Arial" panose="020B0604020202020204" pitchFamily="34" charset="0"/>
+            </a:endParaRPr>
+          </a:p>
+        </p:txBody>
+      </p:sp>
+      <p:sp>
+        <p:nvSpPr>
+          <p:cNvPr id="13" name="Text Box 6">
+            <a:extLst>
+              <a:ext uri="{FF2B5EF4-FFF2-40B4-BE49-F238E27FC236}">
+                <a16:creationId xmlns:a16="http://schemas.microsoft.com/office/drawing/2014/main" id="{7F5B2B30-EB4C-6E84-DBCB-6AE56DF37FDC}"/>
+              </a:ext>
+            </a:extLst>
+          </p:cNvPr>
+          <p:cNvSpPr txBox="1"/>
+          <p:nvPr/>
+        </p:nvSpPr>
+        <p:spPr>
+          <a:xfrm>
+            <a:off x="1188344" y="12547699"/>
+            <a:ext cx="2448272" cy="599171"/>
+          </a:xfrm>
+          <a:prstGeom prst="rect">
+            <a:avLst/>
+          </a:prstGeom>
+          <a:noFill/>
+          <a:ln w="6350">
+            <a:noFill/>
+          </a:ln>
+        </p:spPr>
+        <p:txBody>
+          <a:bodyPr rot="0" spcFirstLastPara="0" vert="horz" wrap="square" lIns="91440" tIns="45720" rIns="91440" bIns="45720" numCol="1" spcCol="0" rtlCol="0" fromWordArt="0" anchor="t" anchorCtr="0" forceAA="0" compatLnSpc="1">
+            <a:prstTxWarp prst="textNoShape">
+              <a:avLst/>
+            </a:prstTxWarp>
+            <a:noAutofit/>
+          </a:bodyPr>
+          <a:lstStyle/>
+          <a:p>
+            <a:pPr>
+              <a:lnSpc>
+                <a:spcPct val="107000"/>
+              </a:lnSpc>
+              <a:spcAft>
+                <a:spcPts val="800"/>
+              </a:spcAft>
+            </a:pPr>
+            <a:r>
+              <a:rPr lang="en-MY" sz="2800" b="1" dirty="0">
                 <a:effectLst/>
                 <a:latin typeface="Arial" panose="020B0604020202020204" pitchFamily="34" charset="0"/>
                 <a:ea typeface="DengXian" panose="02010600030101010101" pitchFamily="2" charset="-122"/>
                 <a:cs typeface="Arial" panose="020B0604020202020204" pitchFamily="34" charset="0"/>
               </a:rPr>
-              <a:t>Understand the reliability of visual  AI-enabled pose estimation technique compared to wearables-based technique such as IMU for ergonomic cumulative damage assessment</a:t>
-            </a:r>
-            <a:r>
-              <a:rPr lang="en-US" sz="2800" i="1" dirty="0">
+              <a:t>Methodology</a:t>
+            </a:r>
+            <a:endParaRPr lang="en-US" sz="2400" dirty="0">
+              <a:effectLst/>
+              <a:latin typeface="Arial" panose="020B0604020202020204" pitchFamily="34" charset="0"/>
+              <a:ea typeface="DengXian" panose="02010600030101010101" pitchFamily="2" charset="-122"/>
+              <a:cs typeface="Arial" panose="020B0604020202020204" pitchFamily="34" charset="0"/>
+            </a:endParaRPr>
+          </a:p>
+        </p:txBody>
+      </p:sp>
+      <p:pic>
+        <p:nvPicPr>
+          <p:cNvPr id="14" name="Picture 13" descr="Icon&#10;&#10;Description automatically generated">
+            <a:extLst>
+              <a:ext uri="{FF2B5EF4-FFF2-40B4-BE49-F238E27FC236}">
+                <a16:creationId xmlns:a16="http://schemas.microsoft.com/office/drawing/2014/main" id="{066CDE10-E119-268A-1CCF-1F03B4A6C689}"/>
+              </a:ext>
+            </a:extLst>
+          </p:cNvPr>
+          <p:cNvPicPr>
+            <a:picLocks noChangeAspect="1"/>
+          </p:cNvPicPr>
+          <p:nvPr/>
+        </p:nvPicPr>
+        <p:blipFill>
+          <a:blip r:embed="rId5">
+            <a:extLst>
+              <a:ext uri="{837473B0-CC2E-450A-ABE3-18F120FF3D39}">
+                <a1611:picAttrSrcUrl xmlns:a1611="http://schemas.microsoft.com/office/drawing/2016/11/main" r:id="rId6"/>
+              </a:ext>
+            </a:extLst>
+          </a:blip>
+          <a:stretch>
+            <a:fillRect/>
+          </a:stretch>
+        </p:blipFill>
+        <p:spPr>
+          <a:xfrm>
+            <a:off x="570508" y="12558410"/>
+            <a:ext cx="545828" cy="534003"/>
+          </a:xfrm>
+          <a:prstGeom prst="rect">
+            <a:avLst/>
+          </a:prstGeom>
+        </p:spPr>
+      </p:pic>
+      <p:grpSp>
+        <p:nvGrpSpPr>
+          <p:cNvPr id="3098" name="Group 3097">
+            <a:extLst>
+              <a:ext uri="{FF2B5EF4-FFF2-40B4-BE49-F238E27FC236}">
+                <a16:creationId xmlns:a16="http://schemas.microsoft.com/office/drawing/2014/main" id="{3F29C3AE-72AA-C7E5-3691-79BBF3801CC0}"/>
+              </a:ext>
+            </a:extLst>
+          </p:cNvPr>
+          <p:cNvGrpSpPr/>
+          <p:nvPr/>
+        </p:nvGrpSpPr>
+        <p:grpSpPr>
+          <a:xfrm>
+            <a:off x="845343" y="13555811"/>
+            <a:ext cx="2664298" cy="2212259"/>
+            <a:chOff x="2848639" y="20854138"/>
+            <a:chExt cx="1764431" cy="1465068"/>
+          </a:xfrm>
+          <a:solidFill>
+            <a:schemeClr val="accent6">
+              <a:lumMod val="20000"/>
+              <a:lumOff val="80000"/>
+            </a:schemeClr>
+          </a:solidFill>
+        </p:grpSpPr>
+        <p:sp>
+          <p:nvSpPr>
+            <p:cNvPr id="3082" name="Rectangle 3081">
+              <a:extLst>
+                <a:ext uri="{FF2B5EF4-FFF2-40B4-BE49-F238E27FC236}">
+                  <a16:creationId xmlns:a16="http://schemas.microsoft.com/office/drawing/2014/main" id="{830ED5F5-1D1A-468E-A9BB-9AD5D16C1CFF}"/>
+                </a:ext>
+              </a:extLst>
+            </p:cNvPr>
+            <p:cNvSpPr/>
+            <p:nvPr/>
+          </p:nvSpPr>
+          <p:spPr>
+            <a:xfrm>
+              <a:off x="2848639" y="20854138"/>
+              <a:ext cx="1764431" cy="1465068"/>
+            </a:xfrm>
+            <a:prstGeom prst="rect">
+              <a:avLst/>
+            </a:prstGeom>
+            <a:noFill/>
+            <a:ln>
+              <a:noFill/>
+            </a:ln>
+          </p:spPr>
+          <p:style>
+            <a:lnRef idx="2">
+              <a:schemeClr val="accent1">
+                <a:shade val="50000"/>
+              </a:schemeClr>
+            </a:lnRef>
+            <a:fillRef idx="1">
+              <a:schemeClr val="accent1"/>
+            </a:fillRef>
+            <a:effectRef idx="0">
+              <a:schemeClr val="accent1"/>
+            </a:effectRef>
+            <a:fontRef idx="minor">
+              <a:schemeClr val="lt1"/>
+            </a:fontRef>
+          </p:style>
+          <p:txBody>
+            <a:bodyPr rtlCol="0" anchor="ctr"/>
+            <a:lstStyle/>
+            <a:p>
+              <a:pPr algn="ctr"/>
+              <a:endParaRPr lang="en-US"/>
+            </a:p>
+          </p:txBody>
+        </p:sp>
+        <p:sp>
+          <p:nvSpPr>
+            <p:cNvPr id="3083" name="Rectangle 3082">
+              <a:extLst>
+                <a:ext uri="{FF2B5EF4-FFF2-40B4-BE49-F238E27FC236}">
+                  <a16:creationId xmlns:a16="http://schemas.microsoft.com/office/drawing/2014/main" id="{A143516D-25FE-693D-8E60-2694895544C1}"/>
+                </a:ext>
+              </a:extLst>
+            </p:cNvPr>
+            <p:cNvSpPr/>
+            <p:nvPr/>
+          </p:nvSpPr>
+          <p:spPr>
+            <a:xfrm>
+              <a:off x="3696160" y="21223993"/>
+              <a:ext cx="482204" cy="428626"/>
+            </a:xfrm>
+            <a:prstGeom prst="rect">
+              <a:avLst/>
+            </a:prstGeom>
+            <a:solidFill>
+              <a:schemeClr val="accent1">
+                <a:lumMod val="20000"/>
+                <a:lumOff val="80000"/>
+              </a:schemeClr>
+            </a:solidFill>
+            <a:ln>
+              <a:solidFill>
+                <a:schemeClr val="accent1">
+                  <a:lumMod val="40000"/>
+                  <a:lumOff val="60000"/>
+                </a:schemeClr>
+              </a:solidFill>
+            </a:ln>
+            <a:scene3d>
+              <a:camera prst="isometricOffAxis1Left"/>
+              <a:lightRig rig="threePt" dir="t"/>
+            </a:scene3d>
+          </p:spPr>
+          <p:style>
+            <a:lnRef idx="2">
+              <a:schemeClr val="accent1">
+                <a:shade val="50000"/>
+              </a:schemeClr>
+            </a:lnRef>
+            <a:fillRef idx="1">
+              <a:schemeClr val="accent1"/>
+            </a:fillRef>
+            <a:effectRef idx="0">
+              <a:schemeClr val="accent1"/>
+            </a:effectRef>
+            <a:fontRef idx="minor">
+              <a:schemeClr val="lt1"/>
+            </a:fontRef>
+          </p:style>
+          <p:txBody>
+            <a:bodyPr rtlCol="0" anchor="ctr"/>
+            <a:lstStyle/>
+            <a:p>
+              <a:pPr algn="ctr"/>
+              <a:endParaRPr lang="en-US"/>
+            </a:p>
+          </p:txBody>
+        </p:sp>
+        <p:sp>
+          <p:nvSpPr>
+            <p:cNvPr id="3084" name="Rectangle 3083">
+              <a:extLst>
+                <a:ext uri="{FF2B5EF4-FFF2-40B4-BE49-F238E27FC236}">
+                  <a16:creationId xmlns:a16="http://schemas.microsoft.com/office/drawing/2014/main" id="{54055900-C863-434E-259E-DC4833232A2E}"/>
+                </a:ext>
+              </a:extLst>
+            </p:cNvPr>
+            <p:cNvSpPr/>
+            <p:nvPr/>
+          </p:nvSpPr>
+          <p:spPr>
+            <a:xfrm>
+              <a:off x="3297689" y="21200399"/>
+              <a:ext cx="482204" cy="428626"/>
+            </a:xfrm>
+            <a:prstGeom prst="rect">
+              <a:avLst/>
+            </a:prstGeom>
+            <a:solidFill>
+              <a:schemeClr val="accent1">
+                <a:lumMod val="20000"/>
+                <a:lumOff val="80000"/>
+              </a:schemeClr>
+            </a:solidFill>
+            <a:ln>
+              <a:solidFill>
+                <a:schemeClr val="accent1">
+                  <a:lumMod val="40000"/>
+                  <a:lumOff val="60000"/>
+                </a:schemeClr>
+              </a:solidFill>
+            </a:ln>
+            <a:scene3d>
+              <a:camera prst="isometricOffAxis1Left"/>
+              <a:lightRig rig="threePt" dir="t"/>
+            </a:scene3d>
+          </p:spPr>
+          <p:style>
+            <a:lnRef idx="2">
+              <a:schemeClr val="accent1">
+                <a:shade val="50000"/>
+              </a:schemeClr>
+            </a:lnRef>
+            <a:fillRef idx="1">
+              <a:schemeClr val="accent1"/>
+            </a:fillRef>
+            <a:effectRef idx="0">
+              <a:schemeClr val="accent1"/>
+            </a:effectRef>
+            <a:fontRef idx="minor">
+              <a:schemeClr val="lt1"/>
+            </a:fontRef>
+          </p:style>
+          <p:txBody>
+            <a:bodyPr rtlCol="0" anchor="ctr"/>
+            <a:lstStyle/>
+            <a:p>
+              <a:pPr algn="ctr"/>
+              <a:endParaRPr lang="en-US"/>
+            </a:p>
+          </p:txBody>
+        </p:sp>
+        <p:sp>
+          <p:nvSpPr>
+            <p:cNvPr id="3085" name="Rectangle 3084">
+              <a:extLst>
+                <a:ext uri="{FF2B5EF4-FFF2-40B4-BE49-F238E27FC236}">
+                  <a16:creationId xmlns:a16="http://schemas.microsoft.com/office/drawing/2014/main" id="{0107135F-BC30-A6F4-A943-9FD825A58353}"/>
+                </a:ext>
+              </a:extLst>
+            </p:cNvPr>
+            <p:cNvSpPr/>
+            <p:nvPr/>
+          </p:nvSpPr>
+          <p:spPr>
+            <a:xfrm>
+              <a:off x="2891698" y="21192036"/>
+              <a:ext cx="482204" cy="428626"/>
+            </a:xfrm>
+            <a:prstGeom prst="rect">
+              <a:avLst/>
+            </a:prstGeom>
+            <a:solidFill>
+              <a:schemeClr val="accent1">
+                <a:lumMod val="20000"/>
+                <a:lumOff val="80000"/>
+              </a:schemeClr>
+            </a:solidFill>
+            <a:ln>
+              <a:solidFill>
+                <a:schemeClr val="accent1">
+                  <a:lumMod val="40000"/>
+                  <a:lumOff val="60000"/>
+                </a:schemeClr>
+              </a:solidFill>
+            </a:ln>
+            <a:scene3d>
+              <a:camera prst="isometricOffAxis1Left"/>
+              <a:lightRig rig="threePt" dir="t"/>
+            </a:scene3d>
+          </p:spPr>
+          <p:style>
+            <a:lnRef idx="2">
+              <a:schemeClr val="accent1">
+                <a:shade val="50000"/>
+              </a:schemeClr>
+            </a:lnRef>
+            <a:fillRef idx="1">
+              <a:schemeClr val="accent1"/>
+            </a:fillRef>
+            <a:effectRef idx="0">
+              <a:schemeClr val="accent1"/>
+            </a:effectRef>
+            <a:fontRef idx="minor">
+              <a:schemeClr val="lt1"/>
+            </a:fontRef>
+          </p:style>
+          <p:txBody>
+            <a:bodyPr rtlCol="0" anchor="ctr"/>
+            <a:lstStyle/>
+            <a:p>
+              <a:pPr algn="ctr"/>
+              <a:endParaRPr lang="en-US"/>
+            </a:p>
+          </p:txBody>
+        </p:sp>
+        <p:sp>
+          <p:nvSpPr>
+            <p:cNvPr id="3088" name="TextBox 3087">
+              <a:extLst>
+                <a:ext uri="{FF2B5EF4-FFF2-40B4-BE49-F238E27FC236}">
+                  <a16:creationId xmlns:a16="http://schemas.microsoft.com/office/drawing/2014/main" id="{2DD90834-3048-C707-BD89-6AF713341C65}"/>
+                </a:ext>
+              </a:extLst>
+            </p:cNvPr>
+            <p:cNvSpPr txBox="1"/>
+            <p:nvPr/>
+          </p:nvSpPr>
+          <p:spPr>
+            <a:xfrm>
+              <a:off x="4223364" y="20949950"/>
+              <a:ext cx="235138" cy="224207"/>
+            </a:xfrm>
+            <a:prstGeom prst="rect">
+              <a:avLst/>
+            </a:prstGeom>
+            <a:noFill/>
+            <a:ln>
+              <a:noFill/>
+            </a:ln>
+          </p:spPr>
+          <p:txBody>
+            <a:bodyPr wrap="square" rtlCol="0">
+              <a:spAutoFit/>
+            </a:bodyPr>
+            <a:lstStyle/>
+            <a:p>
+              <a:r>
+                <a:rPr lang="en-MY" sz="1600" dirty="0">
+                  <a:latin typeface="Arial" panose="020B0604020202020204" pitchFamily="34" charset="0"/>
+                  <a:cs typeface="Arial" panose="020B0604020202020204" pitchFamily="34" charset="0"/>
+                </a:rPr>
+                <a:t>3</a:t>
+              </a:r>
+              <a:endParaRPr lang="en-US" sz="1400" dirty="0">
+                <a:latin typeface="Arial" panose="020B0604020202020204" pitchFamily="34" charset="0"/>
+                <a:cs typeface="Arial" panose="020B0604020202020204" pitchFamily="34" charset="0"/>
+              </a:endParaRPr>
+            </a:p>
+          </p:txBody>
+        </p:sp>
+        <p:cxnSp>
+          <p:nvCxnSpPr>
+            <p:cNvPr id="3089" name="Straight Arrow Connector 3088">
+              <a:extLst>
+                <a:ext uri="{FF2B5EF4-FFF2-40B4-BE49-F238E27FC236}">
+                  <a16:creationId xmlns:a16="http://schemas.microsoft.com/office/drawing/2014/main" id="{1E4D4A4C-7885-BCDA-4E55-2B92688270B1}"/>
+                </a:ext>
+              </a:extLst>
+            </p:cNvPr>
+            <p:cNvCxnSpPr>
+              <a:cxnSpLocks/>
+            </p:cNvCxnSpPr>
+            <p:nvPr/>
+          </p:nvCxnSpPr>
+          <p:spPr>
+            <a:xfrm>
+              <a:off x="3937262" y="21793995"/>
+              <a:ext cx="375787" cy="0"/>
+            </a:xfrm>
+            <a:prstGeom prst="straightConnector1">
+              <a:avLst/>
+            </a:prstGeom>
+            <a:grpFill/>
+            <a:ln>
+              <a:solidFill>
+                <a:schemeClr val="tx1"/>
+              </a:solidFill>
+              <a:headEnd type="triangle"/>
+              <a:tailEnd type="triangle"/>
+            </a:ln>
+          </p:spPr>
+          <p:style>
+            <a:lnRef idx="1">
+              <a:schemeClr val="accent1"/>
+            </a:lnRef>
+            <a:fillRef idx="0">
+              <a:schemeClr val="accent1"/>
+            </a:fillRef>
+            <a:effectRef idx="0">
+              <a:schemeClr val="accent1"/>
+            </a:effectRef>
+            <a:fontRef idx="minor">
+              <a:schemeClr val="tx1"/>
+            </a:fontRef>
+          </p:style>
+        </p:cxnSp>
+        <p:sp>
+          <p:nvSpPr>
+            <p:cNvPr id="3090" name="TextBox 3089">
+              <a:extLst>
+                <a:ext uri="{FF2B5EF4-FFF2-40B4-BE49-F238E27FC236}">
+                  <a16:creationId xmlns:a16="http://schemas.microsoft.com/office/drawing/2014/main" id="{DF7C2515-3DAF-958D-7A11-8DA27CFD1192}"/>
+                </a:ext>
+              </a:extLst>
+            </p:cNvPr>
+            <p:cNvSpPr txBox="1"/>
+            <p:nvPr/>
+          </p:nvSpPr>
+          <p:spPr>
+            <a:xfrm>
+              <a:off x="3788067" y="21928321"/>
+              <a:ext cx="395816" cy="244590"/>
+            </a:xfrm>
+            <a:prstGeom prst="rect">
+              <a:avLst/>
+            </a:prstGeom>
+            <a:noFill/>
+            <a:ln>
+              <a:noFill/>
+            </a:ln>
+          </p:spPr>
+          <p:txBody>
+            <a:bodyPr wrap="square" rtlCol="0">
+              <a:spAutoFit/>
+            </a:bodyPr>
+            <a:lstStyle/>
+            <a:p>
+              <a:r>
+                <a:rPr lang="en-US" sz="1800" dirty="0">
+                  <a:latin typeface="Arial" panose="020B0604020202020204" pitchFamily="34" charset="0"/>
+                  <a:cs typeface="Arial" panose="020B0604020202020204" pitchFamily="34" charset="0"/>
+                </a:rPr>
+                <a:t>dt =</a:t>
+              </a:r>
+            </a:p>
+          </p:txBody>
+        </p:sp>
+        <p:grpSp>
+          <p:nvGrpSpPr>
+            <p:cNvPr id="3091" name="Group 3090">
+              <a:extLst>
+                <a:ext uri="{FF2B5EF4-FFF2-40B4-BE49-F238E27FC236}">
+                  <a16:creationId xmlns:a16="http://schemas.microsoft.com/office/drawing/2014/main" id="{29B31C35-C99A-20DC-A07E-D67CF59A7D6C}"/>
+                </a:ext>
+              </a:extLst>
+            </p:cNvPr>
+            <p:cNvGrpSpPr/>
+            <p:nvPr/>
+          </p:nvGrpSpPr>
+          <p:grpSpPr>
+            <a:xfrm>
+              <a:off x="4057059" y="21845183"/>
+              <a:ext cx="425535" cy="411004"/>
+              <a:chOff x="3423916" y="3871538"/>
+              <a:chExt cx="425535" cy="411004"/>
+            </a:xfrm>
+            <a:grpFill/>
+          </p:grpSpPr>
+          <p:sp>
+            <p:nvSpPr>
+              <p:cNvPr id="3092" name="TextBox 3091">
+                <a:extLst>
+                  <a:ext uri="{FF2B5EF4-FFF2-40B4-BE49-F238E27FC236}">
+                    <a16:creationId xmlns:a16="http://schemas.microsoft.com/office/drawing/2014/main" id="{5AEB64B6-A17A-F87F-0604-1C8383C8A0D4}"/>
+                  </a:ext>
+                </a:extLst>
+              </p:cNvPr>
+              <p:cNvSpPr txBox="1"/>
+              <p:nvPr/>
+            </p:nvSpPr>
+            <p:spPr>
+              <a:xfrm>
+                <a:off x="3503083" y="4037952"/>
+                <a:ext cx="346368" cy="244590"/>
+              </a:xfrm>
+              <a:prstGeom prst="rect">
+                <a:avLst/>
+              </a:prstGeom>
+              <a:noFill/>
+              <a:ln>
+                <a:noFill/>
+              </a:ln>
+            </p:spPr>
+            <p:txBody>
+              <a:bodyPr wrap="square" rtlCol="0">
+                <a:spAutoFit/>
+              </a:bodyPr>
+              <a:lstStyle/>
+              <a:p>
+                <a:r>
+                  <a:rPr lang="en-US" sz="1800" dirty="0">
+                    <a:latin typeface="Arial" panose="020B0604020202020204" pitchFamily="34" charset="0"/>
+                    <a:cs typeface="Arial" panose="020B0604020202020204" pitchFamily="34" charset="0"/>
+                  </a:rPr>
+                  <a:t>fps</a:t>
+                </a:r>
+              </a:p>
+            </p:txBody>
+          </p:sp>
+          <p:sp>
+            <p:nvSpPr>
+              <p:cNvPr id="3093" name="TextBox 3092">
+                <a:extLst>
+                  <a:ext uri="{FF2B5EF4-FFF2-40B4-BE49-F238E27FC236}">
+                    <a16:creationId xmlns:a16="http://schemas.microsoft.com/office/drawing/2014/main" id="{2D73F5D8-5676-1CC9-4A3A-F4BDD3898FCF}"/>
+                  </a:ext>
+                </a:extLst>
+              </p:cNvPr>
+              <p:cNvSpPr txBox="1"/>
+              <p:nvPr/>
+            </p:nvSpPr>
+            <p:spPr>
+              <a:xfrm>
+                <a:off x="3548995" y="3871538"/>
+                <a:ext cx="151449" cy="244590"/>
+              </a:xfrm>
+              <a:prstGeom prst="rect">
+                <a:avLst/>
+              </a:prstGeom>
+              <a:noFill/>
+              <a:ln>
+                <a:noFill/>
+              </a:ln>
+            </p:spPr>
+            <p:txBody>
+              <a:bodyPr wrap="square" rtlCol="0">
+                <a:spAutoFit/>
+              </a:bodyPr>
+              <a:lstStyle/>
+              <a:p>
+                <a:r>
+                  <a:rPr lang="en-US" sz="1800" dirty="0">
+                    <a:latin typeface="Arial" panose="020B0604020202020204" pitchFamily="34" charset="0"/>
+                    <a:cs typeface="Arial" panose="020B0604020202020204" pitchFamily="34" charset="0"/>
+                  </a:rPr>
+                  <a:t>1</a:t>
+                </a:r>
+              </a:p>
+            </p:txBody>
+          </p:sp>
+          <p:cxnSp>
+            <p:nvCxnSpPr>
+              <p:cNvPr id="3094" name="Straight Connector 3093">
+                <a:extLst>
+                  <a:ext uri="{FF2B5EF4-FFF2-40B4-BE49-F238E27FC236}">
+                    <a16:creationId xmlns:a16="http://schemas.microsoft.com/office/drawing/2014/main" id="{FDBB532D-3938-DD2C-F09A-2C5E79452E6D}"/>
+                  </a:ext>
+                </a:extLst>
+              </p:cNvPr>
+              <p:cNvCxnSpPr/>
+              <p:nvPr/>
+            </p:nvCxnSpPr>
+            <p:spPr>
+              <a:xfrm>
+                <a:off x="3423916" y="4072677"/>
+                <a:ext cx="369007" cy="0"/>
+              </a:xfrm>
+              <a:prstGeom prst="line">
+                <a:avLst/>
+              </a:prstGeom>
+              <a:grpFill/>
+              <a:ln w="9525">
+                <a:noFill/>
+              </a:ln>
+            </p:spPr>
+            <p:style>
+              <a:lnRef idx="1">
+                <a:schemeClr val="accent1"/>
+              </a:lnRef>
+              <a:fillRef idx="0">
+                <a:schemeClr val="accent1"/>
+              </a:fillRef>
+              <a:effectRef idx="0">
+                <a:schemeClr val="accent1"/>
+              </a:effectRef>
+              <a:fontRef idx="minor">
+                <a:schemeClr val="tx1"/>
+              </a:fontRef>
+            </p:style>
+          </p:cxnSp>
+        </p:grpSp>
+        <p:sp>
+          <p:nvSpPr>
+            <p:cNvPr id="3095" name="Rectangle 3094">
+              <a:extLst>
+                <a:ext uri="{FF2B5EF4-FFF2-40B4-BE49-F238E27FC236}">
+                  <a16:creationId xmlns:a16="http://schemas.microsoft.com/office/drawing/2014/main" id="{F75E0B62-2B6E-005C-C05A-D661A80076B4}"/>
+                </a:ext>
+              </a:extLst>
+            </p:cNvPr>
+            <p:cNvSpPr/>
+            <p:nvPr/>
+          </p:nvSpPr>
+          <p:spPr>
+            <a:xfrm>
+              <a:off x="4071947" y="21253698"/>
+              <a:ext cx="482204" cy="428626"/>
+            </a:xfrm>
+            <a:prstGeom prst="rect">
+              <a:avLst/>
+            </a:prstGeom>
+            <a:solidFill>
+              <a:schemeClr val="accent1">
+                <a:lumMod val="20000"/>
+                <a:lumOff val="80000"/>
+              </a:schemeClr>
+            </a:solidFill>
+            <a:ln>
+              <a:solidFill>
+                <a:schemeClr val="accent1">
+                  <a:lumMod val="40000"/>
+                  <a:lumOff val="60000"/>
+                </a:schemeClr>
+              </a:solidFill>
+            </a:ln>
+            <a:scene3d>
+              <a:camera prst="isometricOffAxis1Left"/>
+              <a:lightRig rig="threePt" dir="t"/>
+            </a:scene3d>
+          </p:spPr>
+          <p:style>
+            <a:lnRef idx="2">
+              <a:schemeClr val="accent1">
+                <a:shade val="50000"/>
+              </a:schemeClr>
+            </a:lnRef>
+            <a:fillRef idx="1">
+              <a:schemeClr val="accent1"/>
+            </a:fillRef>
+            <a:effectRef idx="0">
+              <a:schemeClr val="accent1"/>
+            </a:effectRef>
+            <a:fontRef idx="minor">
+              <a:schemeClr val="lt1"/>
+            </a:fontRef>
+          </p:style>
+          <p:txBody>
+            <a:bodyPr rtlCol="0" anchor="ctr"/>
+            <a:lstStyle/>
+            <a:p>
+              <a:pPr algn="ctr"/>
+              <a:endParaRPr lang="en-US"/>
+            </a:p>
+          </p:txBody>
+        </p:sp>
+      </p:grpSp>
+      <p:sp>
+        <p:nvSpPr>
+          <p:cNvPr id="3099" name="TextBox 3098">
+            <a:extLst>
+              <a:ext uri="{FF2B5EF4-FFF2-40B4-BE49-F238E27FC236}">
+                <a16:creationId xmlns:a16="http://schemas.microsoft.com/office/drawing/2014/main" id="{1F028FBD-630E-2B05-62BF-912C17C106B5}"/>
+              </a:ext>
+            </a:extLst>
+          </p:cNvPr>
+          <p:cNvSpPr txBox="1"/>
+          <p:nvPr/>
+        </p:nvSpPr>
+        <p:spPr>
+          <a:xfrm>
+            <a:off x="2342788" y="13700481"/>
+            <a:ext cx="355059" cy="338554"/>
+          </a:xfrm>
+          <a:prstGeom prst="rect">
+            <a:avLst/>
+          </a:prstGeom>
+          <a:noFill/>
+          <a:ln>
+            <a:noFill/>
+          </a:ln>
+        </p:spPr>
+        <p:txBody>
+          <a:bodyPr wrap="square" rtlCol="0">
+            <a:spAutoFit/>
+          </a:bodyPr>
+          <a:lstStyle/>
+          <a:p>
+            <a:r>
+              <a:rPr lang="en-MY" sz="1600" dirty="0">
                 <a:latin typeface="Arial" panose="020B0604020202020204" pitchFamily="34" charset="0"/>
                 <a:cs typeface="Arial" panose="020B0604020202020204" pitchFamily="34" charset="0"/>
               </a:rPr>
-              <a:t>.</a:t>
-            </a:r>
-            <a:r>
-              <a:rPr lang="en-MY" sz="2800" i="1" dirty="0">
+              <a:t>2</a:t>
+            </a:r>
+            <a:endParaRPr lang="en-US" sz="1400" dirty="0">
+              <a:latin typeface="Arial" panose="020B0604020202020204" pitchFamily="34" charset="0"/>
+              <a:cs typeface="Arial" panose="020B0604020202020204" pitchFamily="34" charset="0"/>
+            </a:endParaRPr>
+          </a:p>
+        </p:txBody>
+      </p:sp>
+      <p:sp>
+        <p:nvSpPr>
+          <p:cNvPr id="3100" name="TextBox 3099">
+            <a:extLst>
+              <a:ext uri="{FF2B5EF4-FFF2-40B4-BE49-F238E27FC236}">
+                <a16:creationId xmlns:a16="http://schemas.microsoft.com/office/drawing/2014/main" id="{74FC9843-9BF6-CAC3-B8CF-4F756E01ECA5}"/>
+              </a:ext>
+            </a:extLst>
+          </p:cNvPr>
+          <p:cNvSpPr txBox="1"/>
+          <p:nvPr/>
+        </p:nvSpPr>
+        <p:spPr>
+          <a:xfrm>
+            <a:off x="1764393" y="13702480"/>
+            <a:ext cx="355059" cy="338554"/>
+          </a:xfrm>
+          <a:prstGeom prst="rect">
+            <a:avLst/>
+          </a:prstGeom>
+          <a:noFill/>
+          <a:ln>
+            <a:noFill/>
+          </a:ln>
+        </p:spPr>
+        <p:txBody>
+          <a:bodyPr wrap="square" rtlCol="0">
+            <a:spAutoFit/>
+          </a:bodyPr>
+          <a:lstStyle/>
+          <a:p>
+            <a:r>
+              <a:rPr lang="en-MY" sz="1600" dirty="0">
                 <a:latin typeface="Arial" panose="020B0604020202020204" pitchFamily="34" charset="0"/>
                 <a:cs typeface="Arial" panose="020B0604020202020204" pitchFamily="34" charset="0"/>
               </a:rPr>
-              <a:t> </a:t>
-            </a:r>
-          </a:p>
-        </p:txBody>
-      </p:sp>
+              <a:t>1</a:t>
+            </a:r>
+            <a:endParaRPr lang="en-US" sz="1400" dirty="0">
+              <a:latin typeface="Arial" panose="020B0604020202020204" pitchFamily="34" charset="0"/>
+              <a:cs typeface="Arial" panose="020B0604020202020204" pitchFamily="34" charset="0"/>
+            </a:endParaRPr>
+          </a:p>
+        </p:txBody>
+      </p:sp>
+      <p:sp>
+        <p:nvSpPr>
+          <p:cNvPr id="3101" name="TextBox 3100">
+            <a:extLst>
+              <a:ext uri="{FF2B5EF4-FFF2-40B4-BE49-F238E27FC236}">
+                <a16:creationId xmlns:a16="http://schemas.microsoft.com/office/drawing/2014/main" id="{96F9D1E8-D9C3-C27F-72BD-431B233051B8}"/>
+              </a:ext>
+            </a:extLst>
+          </p:cNvPr>
+          <p:cNvSpPr txBox="1"/>
+          <p:nvPr/>
+        </p:nvSpPr>
+        <p:spPr>
+          <a:xfrm>
+            <a:off x="1168351" y="13700481"/>
+            <a:ext cx="355059" cy="338554"/>
+          </a:xfrm>
+          <a:prstGeom prst="rect">
+            <a:avLst/>
+          </a:prstGeom>
+          <a:noFill/>
+          <a:ln>
+            <a:noFill/>
+          </a:ln>
+        </p:spPr>
+        <p:txBody>
+          <a:bodyPr wrap="square" rtlCol="0">
+            <a:spAutoFit/>
+          </a:bodyPr>
+          <a:lstStyle/>
+          <a:p>
+            <a:r>
+              <a:rPr lang="en-MY" sz="1600" dirty="0">
+                <a:latin typeface="Arial" panose="020B0604020202020204" pitchFamily="34" charset="0"/>
+                <a:cs typeface="Arial" panose="020B0604020202020204" pitchFamily="34" charset="0"/>
+              </a:rPr>
+              <a:t>0</a:t>
+            </a:r>
+            <a:endParaRPr lang="en-US" sz="1400" dirty="0">
+              <a:latin typeface="Arial" panose="020B0604020202020204" pitchFamily="34" charset="0"/>
+              <a:cs typeface="Arial" panose="020B0604020202020204" pitchFamily="34" charset="0"/>
+            </a:endParaRPr>
+          </a:p>
+        </p:txBody>
+      </p:sp>
+      <p:sp>
+        <p:nvSpPr>
+          <p:cNvPr id="3102" name="Text Box 36">
+            <a:extLst>
+              <a:ext uri="{FF2B5EF4-FFF2-40B4-BE49-F238E27FC236}">
+                <a16:creationId xmlns:a16="http://schemas.microsoft.com/office/drawing/2014/main" id="{4465BFED-23E6-E2A7-EC24-A89B85B0177E}"/>
+              </a:ext>
+            </a:extLst>
+          </p:cNvPr>
+          <p:cNvSpPr txBox="1"/>
+          <p:nvPr/>
+        </p:nvSpPr>
+        <p:spPr>
+          <a:xfrm>
+            <a:off x="756296" y="15886324"/>
+            <a:ext cx="2897359" cy="557124"/>
+          </a:xfrm>
+          <a:prstGeom prst="rect">
+            <a:avLst/>
+          </a:prstGeom>
+          <a:noFill/>
+          <a:ln w="6350">
+            <a:noFill/>
+          </a:ln>
+        </p:spPr>
+        <p:txBody>
+          <a:bodyPr rot="0" spcFirstLastPara="0" vert="horz" wrap="square" lIns="91440" tIns="45720" rIns="91440" bIns="45720" numCol="1" spcCol="0" rtlCol="0" fromWordArt="0" anchor="t" anchorCtr="0" forceAA="0" compatLnSpc="1">
+            <a:prstTxWarp prst="textNoShape">
+              <a:avLst/>
+            </a:prstTxWarp>
+            <a:noAutofit/>
+          </a:bodyPr>
+          <a:lstStyle/>
+          <a:p>
+            <a:pPr>
+              <a:lnSpc>
+                <a:spcPct val="107000"/>
+              </a:lnSpc>
+              <a:spcAft>
+                <a:spcPts val="800"/>
+              </a:spcAft>
+            </a:pPr>
+            <a:r>
+              <a:rPr lang="en-MY" sz="2400" dirty="0">
+                <a:latin typeface="Arial" panose="020B0604020202020204" pitchFamily="34" charset="0"/>
+                <a:ea typeface="DengXian" panose="02010600030101010101" pitchFamily="2" charset="-122"/>
+                <a:cs typeface="Arial" panose="020B0604020202020204" pitchFamily="34" charset="0"/>
+              </a:rPr>
+              <a:t>Data Preprocessing</a:t>
+            </a:r>
+            <a:endParaRPr lang="en-US" sz="2400" dirty="0">
+              <a:effectLst/>
+              <a:latin typeface="Arial" panose="020B0604020202020204" pitchFamily="34" charset="0"/>
+              <a:ea typeface="DengXian" panose="02010600030101010101" pitchFamily="2" charset="-122"/>
+              <a:cs typeface="Arial" panose="020B0604020202020204" pitchFamily="34" charset="0"/>
+            </a:endParaRPr>
+          </a:p>
+        </p:txBody>
+      </p:sp>
+      <p:sp>
+        <p:nvSpPr>
+          <p:cNvPr id="3103" name="Arrow: Right 3102">
+            <a:extLst>
+              <a:ext uri="{FF2B5EF4-FFF2-40B4-BE49-F238E27FC236}">
+                <a16:creationId xmlns:a16="http://schemas.microsoft.com/office/drawing/2014/main" id="{0A8EDDC9-F2EF-0CBC-49D5-58625E3C1450}"/>
+              </a:ext>
+            </a:extLst>
+          </p:cNvPr>
+          <p:cNvSpPr/>
+          <p:nvPr/>
+        </p:nvSpPr>
+        <p:spPr>
+          <a:xfrm>
+            <a:off x="3895365" y="14242047"/>
+            <a:ext cx="1656184" cy="806610"/>
+          </a:xfrm>
+          <a:prstGeom prst="rightArrow">
+            <a:avLst/>
+          </a:prstGeom>
+          <a:solidFill>
+            <a:schemeClr val="accent1">
+              <a:lumMod val="20000"/>
+              <a:lumOff val="80000"/>
+            </a:schemeClr>
+          </a:solidFill>
+          <a:ln>
+            <a:solidFill>
+              <a:schemeClr val="accent1">
+                <a:lumMod val="20000"/>
+                <a:lumOff val="80000"/>
+              </a:schemeClr>
+            </a:solidFill>
+          </a:ln>
+        </p:spPr>
+        <p:style>
+          <a:lnRef idx="2">
+            <a:schemeClr val="accent1">
+              <a:shade val="50000"/>
+            </a:schemeClr>
+          </a:lnRef>
+          <a:fillRef idx="1">
+            <a:schemeClr val="accent1"/>
+          </a:fillRef>
+          <a:effectRef idx="0">
+            <a:schemeClr val="accent1"/>
+          </a:effectRef>
+          <a:fontRef idx="minor">
+            <a:schemeClr val="lt1"/>
+          </a:fontRef>
+        </p:style>
+        <p:txBody>
+          <a:bodyPr rtlCol="0" anchor="ctr"/>
+          <a:lstStyle/>
+          <a:p>
+            <a:pPr algn="ctr"/>
+            <a:endParaRPr lang="en-US"/>
+          </a:p>
+        </p:txBody>
+      </p:sp>
+      <p:sp>
+        <p:nvSpPr>
+          <p:cNvPr id="3105" name="Oval 3104">
+            <a:extLst>
+              <a:ext uri="{FF2B5EF4-FFF2-40B4-BE49-F238E27FC236}">
+                <a16:creationId xmlns:a16="http://schemas.microsoft.com/office/drawing/2014/main" id="{CCE1A0CC-ED4D-E537-8DFA-ABF90D19D58A}"/>
+              </a:ext>
+            </a:extLst>
+          </p:cNvPr>
+          <p:cNvSpPr/>
+          <p:nvPr/>
+        </p:nvSpPr>
+        <p:spPr>
+          <a:xfrm>
+            <a:off x="6054608" y="13669520"/>
+            <a:ext cx="296552" cy="296552"/>
+          </a:xfrm>
+          <a:prstGeom prst="ellipse">
+            <a:avLst/>
+          </a:prstGeom>
+          <a:solidFill>
+            <a:schemeClr val="accent6">
+              <a:lumMod val="20000"/>
+              <a:lumOff val="80000"/>
+            </a:schemeClr>
+          </a:solidFill>
+          <a:ln>
+            <a:noFill/>
+          </a:ln>
+        </p:spPr>
+        <p:style>
+          <a:lnRef idx="2">
+            <a:schemeClr val="accent1">
+              <a:shade val="50000"/>
+            </a:schemeClr>
+          </a:lnRef>
+          <a:fillRef idx="1">
+            <a:schemeClr val="accent1"/>
+          </a:fillRef>
+          <a:effectRef idx="0">
+            <a:schemeClr val="accent1"/>
+          </a:effectRef>
+          <a:fontRef idx="minor">
+            <a:schemeClr val="lt1"/>
+          </a:fontRef>
+        </p:style>
+        <p:txBody>
+          <a:bodyPr rtlCol="0" anchor="ctr"/>
+          <a:lstStyle/>
+          <a:p>
+            <a:pPr algn="ctr"/>
+            <a:endParaRPr lang="en-US"/>
+          </a:p>
+        </p:txBody>
+      </p:sp>
+      <p:sp>
+        <p:nvSpPr>
+          <p:cNvPr id="3106" name="Oval 3105">
+            <a:extLst>
+              <a:ext uri="{FF2B5EF4-FFF2-40B4-BE49-F238E27FC236}">
+                <a16:creationId xmlns:a16="http://schemas.microsoft.com/office/drawing/2014/main" id="{5F2F85D5-F4B0-5DC5-EF2E-B93A2072B334}"/>
+              </a:ext>
+            </a:extLst>
+          </p:cNvPr>
+          <p:cNvSpPr/>
+          <p:nvPr/>
+        </p:nvSpPr>
+        <p:spPr>
+          <a:xfrm>
+            <a:off x="6054608" y="14268857"/>
+            <a:ext cx="296552" cy="296552"/>
+          </a:xfrm>
+          <a:prstGeom prst="ellipse">
+            <a:avLst/>
+          </a:prstGeom>
+          <a:solidFill>
+            <a:schemeClr val="accent6">
+              <a:lumMod val="20000"/>
+              <a:lumOff val="80000"/>
+            </a:schemeClr>
+          </a:solidFill>
+          <a:ln>
+            <a:noFill/>
+          </a:ln>
+        </p:spPr>
+        <p:style>
+          <a:lnRef idx="2">
+            <a:schemeClr val="accent1">
+              <a:shade val="50000"/>
+            </a:schemeClr>
+          </a:lnRef>
+          <a:fillRef idx="1">
+            <a:schemeClr val="accent1"/>
+          </a:fillRef>
+          <a:effectRef idx="0">
+            <a:schemeClr val="accent1"/>
+          </a:effectRef>
+          <a:fontRef idx="minor">
+            <a:schemeClr val="lt1"/>
+          </a:fontRef>
+        </p:style>
+        <p:txBody>
+          <a:bodyPr rtlCol="0" anchor="ctr"/>
+          <a:lstStyle/>
+          <a:p>
+            <a:pPr algn="ctr"/>
+            <a:endParaRPr lang="en-US"/>
+          </a:p>
+        </p:txBody>
+      </p:sp>
+      <p:sp>
+        <p:nvSpPr>
+          <p:cNvPr id="3107" name="Oval 3106">
+            <a:extLst>
+              <a:ext uri="{FF2B5EF4-FFF2-40B4-BE49-F238E27FC236}">
+                <a16:creationId xmlns:a16="http://schemas.microsoft.com/office/drawing/2014/main" id="{467DA63B-2AC2-05A7-90E5-177098639EA9}"/>
+              </a:ext>
+            </a:extLst>
+          </p:cNvPr>
+          <p:cNvSpPr/>
+          <p:nvPr/>
+        </p:nvSpPr>
+        <p:spPr>
+          <a:xfrm>
+            <a:off x="6054608" y="14847776"/>
+            <a:ext cx="296552" cy="296552"/>
+          </a:xfrm>
+          <a:prstGeom prst="ellipse">
+            <a:avLst/>
+          </a:prstGeom>
+          <a:solidFill>
+            <a:schemeClr val="accent6">
+              <a:lumMod val="20000"/>
+              <a:lumOff val="80000"/>
+            </a:schemeClr>
+          </a:solidFill>
+          <a:ln>
+            <a:noFill/>
+          </a:ln>
+        </p:spPr>
+        <p:style>
+          <a:lnRef idx="2">
+            <a:schemeClr val="accent1">
+              <a:shade val="50000"/>
+            </a:schemeClr>
+          </a:lnRef>
+          <a:fillRef idx="1">
+            <a:schemeClr val="accent1"/>
+          </a:fillRef>
+          <a:effectRef idx="0">
+            <a:schemeClr val="accent1"/>
+          </a:effectRef>
+          <a:fontRef idx="minor">
+            <a:schemeClr val="lt1"/>
+          </a:fontRef>
+        </p:style>
+        <p:txBody>
+          <a:bodyPr rtlCol="0" anchor="ctr"/>
+          <a:lstStyle/>
+          <a:p>
+            <a:pPr algn="ctr"/>
+            <a:endParaRPr lang="en-US"/>
+          </a:p>
+        </p:txBody>
+      </p:sp>
+      <p:sp>
+        <p:nvSpPr>
+          <p:cNvPr id="3108" name="Oval 3107">
+            <a:extLst>
+              <a:ext uri="{FF2B5EF4-FFF2-40B4-BE49-F238E27FC236}">
+                <a16:creationId xmlns:a16="http://schemas.microsoft.com/office/drawing/2014/main" id="{0380CB3E-5519-C284-AD6E-132561D81D1A}"/>
+              </a:ext>
+            </a:extLst>
+          </p:cNvPr>
+          <p:cNvSpPr/>
+          <p:nvPr/>
+        </p:nvSpPr>
+        <p:spPr>
+          <a:xfrm>
+            <a:off x="7287264" y="13319259"/>
+            <a:ext cx="296552" cy="296552"/>
+          </a:xfrm>
+          <a:prstGeom prst="ellipse">
+            <a:avLst/>
+          </a:prstGeom>
+          <a:solidFill>
+            <a:schemeClr val="accent3">
+              <a:lumMod val="60000"/>
+              <a:lumOff val="40000"/>
+            </a:schemeClr>
+          </a:solidFill>
+          <a:ln>
+            <a:noFill/>
+          </a:ln>
+        </p:spPr>
+        <p:style>
+          <a:lnRef idx="2">
+            <a:schemeClr val="accent1">
+              <a:shade val="50000"/>
+            </a:schemeClr>
+          </a:lnRef>
+          <a:fillRef idx="1">
+            <a:schemeClr val="accent1"/>
+          </a:fillRef>
+          <a:effectRef idx="0">
+            <a:schemeClr val="accent1"/>
+          </a:effectRef>
+          <a:fontRef idx="minor">
+            <a:schemeClr val="lt1"/>
+          </a:fontRef>
+        </p:style>
+        <p:txBody>
+          <a:bodyPr rtlCol="0" anchor="ctr"/>
+          <a:lstStyle/>
+          <a:p>
+            <a:pPr algn="ctr"/>
+            <a:endParaRPr lang="en-US"/>
+          </a:p>
+        </p:txBody>
+      </p:sp>
+      <p:sp>
+        <p:nvSpPr>
+          <p:cNvPr id="3109" name="Oval 3108">
+            <a:extLst>
+              <a:ext uri="{FF2B5EF4-FFF2-40B4-BE49-F238E27FC236}">
+                <a16:creationId xmlns:a16="http://schemas.microsoft.com/office/drawing/2014/main" id="{C999CB5C-EAF6-ED51-83CF-C2D6CD2C518E}"/>
+              </a:ext>
+            </a:extLst>
+          </p:cNvPr>
+          <p:cNvSpPr/>
+          <p:nvPr/>
+        </p:nvSpPr>
+        <p:spPr>
+          <a:xfrm>
+            <a:off x="7287264" y="13949411"/>
+            <a:ext cx="296552" cy="296552"/>
+          </a:xfrm>
+          <a:prstGeom prst="ellipse">
+            <a:avLst/>
+          </a:prstGeom>
+          <a:solidFill>
+            <a:schemeClr val="accent3">
+              <a:lumMod val="60000"/>
+              <a:lumOff val="40000"/>
+            </a:schemeClr>
+          </a:solidFill>
+          <a:ln>
+            <a:noFill/>
+          </a:ln>
+        </p:spPr>
+        <p:style>
+          <a:lnRef idx="2">
+            <a:schemeClr val="accent1">
+              <a:shade val="50000"/>
+            </a:schemeClr>
+          </a:lnRef>
+          <a:fillRef idx="1">
+            <a:schemeClr val="accent1"/>
+          </a:fillRef>
+          <a:effectRef idx="0">
+            <a:schemeClr val="accent1"/>
+          </a:effectRef>
+          <a:fontRef idx="minor">
+            <a:schemeClr val="lt1"/>
+          </a:fontRef>
+        </p:style>
+        <p:txBody>
+          <a:bodyPr rtlCol="0" anchor="ctr"/>
+          <a:lstStyle/>
+          <a:p>
+            <a:pPr algn="ctr"/>
+            <a:endParaRPr lang="en-US"/>
+          </a:p>
+        </p:txBody>
+      </p:sp>
+      <p:sp>
+        <p:nvSpPr>
+          <p:cNvPr id="3110" name="Oval 3109">
+            <a:extLst>
+              <a:ext uri="{FF2B5EF4-FFF2-40B4-BE49-F238E27FC236}">
+                <a16:creationId xmlns:a16="http://schemas.microsoft.com/office/drawing/2014/main" id="{E2F3A04D-8C21-5D19-73C5-86DDA850BEEC}"/>
+              </a:ext>
+            </a:extLst>
+          </p:cNvPr>
+          <p:cNvSpPr/>
+          <p:nvPr/>
+        </p:nvSpPr>
+        <p:spPr>
+          <a:xfrm>
+            <a:off x="7287264" y="14604970"/>
+            <a:ext cx="296552" cy="296552"/>
+          </a:xfrm>
+          <a:prstGeom prst="ellipse">
+            <a:avLst/>
+          </a:prstGeom>
+          <a:solidFill>
+            <a:schemeClr val="accent3">
+              <a:lumMod val="60000"/>
+              <a:lumOff val="40000"/>
+            </a:schemeClr>
+          </a:solidFill>
+          <a:ln>
+            <a:noFill/>
+          </a:ln>
+        </p:spPr>
+        <p:style>
+          <a:lnRef idx="2">
+            <a:schemeClr val="accent1">
+              <a:shade val="50000"/>
+            </a:schemeClr>
+          </a:lnRef>
+          <a:fillRef idx="1">
+            <a:schemeClr val="accent1"/>
+          </a:fillRef>
+          <a:effectRef idx="0">
+            <a:schemeClr val="accent1"/>
+          </a:effectRef>
+          <a:fontRef idx="minor">
+            <a:schemeClr val="lt1"/>
+          </a:fontRef>
+        </p:style>
+        <p:txBody>
+          <a:bodyPr rtlCol="0" anchor="ctr"/>
+          <a:lstStyle/>
+          <a:p>
+            <a:pPr algn="ctr"/>
+            <a:endParaRPr lang="en-US"/>
+          </a:p>
+        </p:txBody>
+      </p:sp>
+      <p:sp>
+        <p:nvSpPr>
+          <p:cNvPr id="3111" name="Oval 3110">
+            <a:extLst>
+              <a:ext uri="{FF2B5EF4-FFF2-40B4-BE49-F238E27FC236}">
+                <a16:creationId xmlns:a16="http://schemas.microsoft.com/office/drawing/2014/main" id="{10B2E6FB-ED96-07A5-5AAF-B4B739736CB5}"/>
+              </a:ext>
+            </a:extLst>
+          </p:cNvPr>
+          <p:cNvSpPr/>
+          <p:nvPr/>
+        </p:nvSpPr>
+        <p:spPr>
+          <a:xfrm>
+            <a:off x="7287264" y="15235122"/>
+            <a:ext cx="296552" cy="296552"/>
+          </a:xfrm>
+          <a:prstGeom prst="ellipse">
+            <a:avLst/>
+          </a:prstGeom>
+          <a:solidFill>
+            <a:schemeClr val="accent3">
+              <a:lumMod val="60000"/>
+              <a:lumOff val="40000"/>
+            </a:schemeClr>
+          </a:solidFill>
+          <a:ln>
+            <a:noFill/>
+          </a:ln>
+        </p:spPr>
+        <p:style>
+          <a:lnRef idx="2">
+            <a:schemeClr val="accent1">
+              <a:shade val="50000"/>
+            </a:schemeClr>
+          </a:lnRef>
+          <a:fillRef idx="1">
+            <a:schemeClr val="accent1"/>
+          </a:fillRef>
+          <a:effectRef idx="0">
+            <a:schemeClr val="accent1"/>
+          </a:effectRef>
+          <a:fontRef idx="minor">
+            <a:schemeClr val="lt1"/>
+          </a:fontRef>
+        </p:style>
+        <p:txBody>
+          <a:bodyPr rtlCol="0" anchor="ctr"/>
+          <a:lstStyle/>
+          <a:p>
+            <a:pPr algn="ctr"/>
+            <a:endParaRPr lang="en-US"/>
+          </a:p>
+        </p:txBody>
+      </p:sp>
+      <p:sp>
+        <p:nvSpPr>
+          <p:cNvPr id="3112" name="Oval 3111">
+            <a:extLst>
+              <a:ext uri="{FF2B5EF4-FFF2-40B4-BE49-F238E27FC236}">
+                <a16:creationId xmlns:a16="http://schemas.microsoft.com/office/drawing/2014/main" id="{A0D1E7BB-36AF-9165-3A6D-9F17FBCE17EC}"/>
+              </a:ext>
+            </a:extLst>
+          </p:cNvPr>
+          <p:cNvSpPr/>
+          <p:nvPr/>
+        </p:nvSpPr>
+        <p:spPr>
+          <a:xfrm>
+            <a:off x="8485928" y="13647891"/>
+            <a:ext cx="296552" cy="296552"/>
+          </a:xfrm>
+          <a:prstGeom prst="ellipse">
+            <a:avLst/>
+          </a:prstGeom>
+          <a:solidFill>
+            <a:schemeClr val="accent6">
+              <a:lumMod val="20000"/>
+              <a:lumOff val="80000"/>
+            </a:schemeClr>
+          </a:solidFill>
+          <a:ln>
+            <a:noFill/>
+          </a:ln>
+        </p:spPr>
+        <p:style>
+          <a:lnRef idx="2">
+            <a:schemeClr val="accent1">
+              <a:shade val="50000"/>
+            </a:schemeClr>
+          </a:lnRef>
+          <a:fillRef idx="1">
+            <a:schemeClr val="accent1"/>
+          </a:fillRef>
+          <a:effectRef idx="0">
+            <a:schemeClr val="accent1"/>
+          </a:effectRef>
+          <a:fontRef idx="minor">
+            <a:schemeClr val="lt1"/>
+          </a:fontRef>
+        </p:style>
+        <p:txBody>
+          <a:bodyPr rtlCol="0" anchor="ctr"/>
+          <a:lstStyle/>
+          <a:p>
+            <a:pPr algn="ctr"/>
+            <a:endParaRPr lang="en-US"/>
+          </a:p>
+        </p:txBody>
+      </p:sp>
+      <p:sp>
+        <p:nvSpPr>
+          <p:cNvPr id="3113" name="Oval 3112">
+            <a:extLst>
+              <a:ext uri="{FF2B5EF4-FFF2-40B4-BE49-F238E27FC236}">
+                <a16:creationId xmlns:a16="http://schemas.microsoft.com/office/drawing/2014/main" id="{3C01D93A-6D14-EA84-E31A-034F022F1C08}"/>
+              </a:ext>
+            </a:extLst>
+          </p:cNvPr>
+          <p:cNvSpPr/>
+          <p:nvPr/>
+        </p:nvSpPr>
+        <p:spPr>
+          <a:xfrm>
+            <a:off x="8485928" y="14247228"/>
+            <a:ext cx="296552" cy="296552"/>
+          </a:xfrm>
+          <a:prstGeom prst="ellipse">
+            <a:avLst/>
+          </a:prstGeom>
+          <a:solidFill>
+            <a:schemeClr val="accent6">
+              <a:lumMod val="20000"/>
+              <a:lumOff val="80000"/>
+            </a:schemeClr>
+          </a:solidFill>
+          <a:ln>
+            <a:noFill/>
+          </a:ln>
+        </p:spPr>
+        <p:style>
+          <a:lnRef idx="2">
+            <a:schemeClr val="accent1">
+              <a:shade val="50000"/>
+            </a:schemeClr>
+          </a:lnRef>
+          <a:fillRef idx="1">
+            <a:schemeClr val="accent1"/>
+          </a:fillRef>
+          <a:effectRef idx="0">
+            <a:schemeClr val="accent1"/>
+          </a:effectRef>
+          <a:fontRef idx="minor">
+            <a:schemeClr val="lt1"/>
+          </a:fontRef>
+        </p:style>
+        <p:txBody>
+          <a:bodyPr rtlCol="0" anchor="ctr"/>
+          <a:lstStyle/>
+          <a:p>
+            <a:pPr algn="ctr"/>
+            <a:endParaRPr lang="en-US"/>
+          </a:p>
+        </p:txBody>
+      </p:sp>
+      <p:sp>
+        <p:nvSpPr>
+          <p:cNvPr id="3114" name="Oval 3113">
+            <a:extLst>
+              <a:ext uri="{FF2B5EF4-FFF2-40B4-BE49-F238E27FC236}">
+                <a16:creationId xmlns:a16="http://schemas.microsoft.com/office/drawing/2014/main" id="{527286FD-589F-927C-F7F9-3BBE734CF0E7}"/>
+              </a:ext>
+            </a:extLst>
+          </p:cNvPr>
+          <p:cNvSpPr/>
+          <p:nvPr/>
+        </p:nvSpPr>
+        <p:spPr>
+          <a:xfrm>
+            <a:off x="8485928" y="14826147"/>
+            <a:ext cx="296552" cy="296552"/>
+          </a:xfrm>
+          <a:prstGeom prst="ellipse">
+            <a:avLst/>
+          </a:prstGeom>
+          <a:solidFill>
+            <a:schemeClr val="accent6">
+              <a:lumMod val="20000"/>
+              <a:lumOff val="80000"/>
+            </a:schemeClr>
+          </a:solidFill>
+          <a:ln>
+            <a:noFill/>
+          </a:ln>
+        </p:spPr>
+        <p:style>
+          <a:lnRef idx="2">
+            <a:schemeClr val="accent1">
+              <a:shade val="50000"/>
+            </a:schemeClr>
+          </a:lnRef>
+          <a:fillRef idx="1">
+            <a:schemeClr val="accent1"/>
+          </a:fillRef>
+          <a:effectRef idx="0">
+            <a:schemeClr val="accent1"/>
+          </a:effectRef>
+          <a:fontRef idx="minor">
+            <a:schemeClr val="lt1"/>
+          </a:fontRef>
+        </p:style>
+        <p:txBody>
+          <a:bodyPr rtlCol="0" anchor="ctr"/>
+          <a:lstStyle/>
+          <a:p>
+            <a:pPr algn="ctr"/>
+            <a:endParaRPr lang="en-US"/>
+          </a:p>
+        </p:txBody>
+      </p:sp>
+      <p:cxnSp>
+        <p:nvCxnSpPr>
+          <p:cNvPr id="3116" name="Straight Connector 3115">
+            <a:extLst>
+              <a:ext uri="{FF2B5EF4-FFF2-40B4-BE49-F238E27FC236}">
+                <a16:creationId xmlns:a16="http://schemas.microsoft.com/office/drawing/2014/main" id="{46EF42BB-0AD3-FE4D-45B0-930926BFD4EF}"/>
+              </a:ext>
+            </a:extLst>
+          </p:cNvPr>
+          <p:cNvCxnSpPr>
+            <a:stCxn id="3105" idx="7"/>
+            <a:endCxn id="3108" idx="2"/>
+          </p:cNvCxnSpPr>
+          <p:nvPr/>
+        </p:nvCxnSpPr>
+        <p:spPr>
+          <a:xfrm flipV="1">
+            <a:off x="6307731" y="13467535"/>
+            <a:ext cx="979533" cy="245414"/>
+          </a:xfrm>
+          <a:prstGeom prst="line">
+            <a:avLst/>
+          </a:prstGeom>
+        </p:spPr>
+        <p:style>
+          <a:lnRef idx="1">
+            <a:schemeClr val="accent1"/>
+          </a:lnRef>
+          <a:fillRef idx="0">
+            <a:schemeClr val="accent1"/>
+          </a:fillRef>
+          <a:effectRef idx="0">
+            <a:schemeClr val="accent1"/>
+          </a:effectRef>
+          <a:fontRef idx="minor">
+            <a:schemeClr val="tx1"/>
+          </a:fontRef>
+        </p:style>
+      </p:cxnSp>
+      <p:cxnSp>
+        <p:nvCxnSpPr>
+          <p:cNvPr id="3117" name="Straight Connector 3116">
+            <a:extLst>
+              <a:ext uri="{FF2B5EF4-FFF2-40B4-BE49-F238E27FC236}">
+                <a16:creationId xmlns:a16="http://schemas.microsoft.com/office/drawing/2014/main" id="{F7B044C2-802B-E46F-8F64-ED761D6C288D}"/>
+              </a:ext>
+            </a:extLst>
+          </p:cNvPr>
+          <p:cNvCxnSpPr>
+            <a:cxnSpLocks/>
+            <a:stCxn id="3105" idx="6"/>
+            <a:endCxn id="3109" idx="2"/>
+          </p:cNvCxnSpPr>
+          <p:nvPr/>
+        </p:nvCxnSpPr>
+        <p:spPr>
+          <a:xfrm>
+            <a:off x="6351160" y="13817796"/>
+            <a:ext cx="936104" cy="279891"/>
+          </a:xfrm>
+          <a:prstGeom prst="line">
+            <a:avLst/>
+          </a:prstGeom>
+        </p:spPr>
+        <p:style>
+          <a:lnRef idx="1">
+            <a:schemeClr val="accent1"/>
+          </a:lnRef>
+          <a:fillRef idx="0">
+            <a:schemeClr val="accent1"/>
+          </a:fillRef>
+          <a:effectRef idx="0">
+            <a:schemeClr val="accent1"/>
+          </a:effectRef>
+          <a:fontRef idx="minor">
+            <a:schemeClr val="tx1"/>
+          </a:fontRef>
+        </p:style>
+      </p:cxnSp>
+      <p:cxnSp>
+        <p:nvCxnSpPr>
+          <p:cNvPr id="3120" name="Straight Connector 3119">
+            <a:extLst>
+              <a:ext uri="{FF2B5EF4-FFF2-40B4-BE49-F238E27FC236}">
+                <a16:creationId xmlns:a16="http://schemas.microsoft.com/office/drawing/2014/main" id="{6A333640-DF65-9BF3-E2FD-9C5515CA7F74}"/>
+              </a:ext>
+            </a:extLst>
+          </p:cNvPr>
+          <p:cNvCxnSpPr>
+            <a:cxnSpLocks/>
+            <a:endCxn id="3110" idx="2"/>
+          </p:cNvCxnSpPr>
+          <p:nvPr/>
+        </p:nvCxnSpPr>
+        <p:spPr>
+          <a:xfrm>
+            <a:off x="6334164" y="13893862"/>
+            <a:ext cx="953100" cy="859384"/>
+          </a:xfrm>
+          <a:prstGeom prst="line">
+            <a:avLst/>
+          </a:prstGeom>
+        </p:spPr>
+        <p:style>
+          <a:lnRef idx="1">
+            <a:schemeClr val="accent1"/>
+          </a:lnRef>
+          <a:fillRef idx="0">
+            <a:schemeClr val="accent1"/>
+          </a:fillRef>
+          <a:effectRef idx="0">
+            <a:schemeClr val="accent1"/>
+          </a:effectRef>
+          <a:fontRef idx="minor">
+            <a:schemeClr val="tx1"/>
+          </a:fontRef>
+        </p:style>
+      </p:cxnSp>
+      <p:cxnSp>
+        <p:nvCxnSpPr>
+          <p:cNvPr id="3122" name="Straight Connector 3121">
+            <a:extLst>
+              <a:ext uri="{FF2B5EF4-FFF2-40B4-BE49-F238E27FC236}">
+                <a16:creationId xmlns:a16="http://schemas.microsoft.com/office/drawing/2014/main" id="{20BD474A-894A-0728-B106-8F765A0DC623}"/>
+              </a:ext>
+            </a:extLst>
+          </p:cNvPr>
+          <p:cNvCxnSpPr>
+            <a:cxnSpLocks/>
+            <a:stCxn id="3105" idx="5"/>
+            <a:endCxn id="3111" idx="2"/>
+          </p:cNvCxnSpPr>
+          <p:nvPr/>
+        </p:nvCxnSpPr>
+        <p:spPr>
+          <a:xfrm>
+            <a:off x="6307731" y="13922643"/>
+            <a:ext cx="979533" cy="1460755"/>
+          </a:xfrm>
+          <a:prstGeom prst="line">
+            <a:avLst/>
+          </a:prstGeom>
+        </p:spPr>
+        <p:style>
+          <a:lnRef idx="1">
+            <a:schemeClr val="accent1"/>
+          </a:lnRef>
+          <a:fillRef idx="0">
+            <a:schemeClr val="accent1"/>
+          </a:fillRef>
+          <a:effectRef idx="0">
+            <a:schemeClr val="accent1"/>
+          </a:effectRef>
+          <a:fontRef idx="minor">
+            <a:schemeClr val="tx1"/>
+          </a:fontRef>
+        </p:style>
+      </p:cxnSp>
+      <p:cxnSp>
+        <p:nvCxnSpPr>
+          <p:cNvPr id="3125" name="Straight Connector 3124">
+            <a:extLst>
+              <a:ext uri="{FF2B5EF4-FFF2-40B4-BE49-F238E27FC236}">
+                <a16:creationId xmlns:a16="http://schemas.microsoft.com/office/drawing/2014/main" id="{AC128052-75CB-A3AE-F13B-50F35C5C9AE1}"/>
+              </a:ext>
+            </a:extLst>
+          </p:cNvPr>
+          <p:cNvCxnSpPr>
+            <a:cxnSpLocks/>
+            <a:stCxn id="3106" idx="7"/>
+            <a:endCxn id="3108" idx="3"/>
+          </p:cNvCxnSpPr>
+          <p:nvPr/>
+        </p:nvCxnSpPr>
+        <p:spPr>
+          <a:xfrm flipV="1">
+            <a:off x="6307731" y="13572382"/>
+            <a:ext cx="1022962" cy="739904"/>
+          </a:xfrm>
+          <a:prstGeom prst="line">
+            <a:avLst/>
+          </a:prstGeom>
+        </p:spPr>
+        <p:style>
+          <a:lnRef idx="1">
+            <a:schemeClr val="accent1"/>
+          </a:lnRef>
+          <a:fillRef idx="0">
+            <a:schemeClr val="accent1"/>
+          </a:fillRef>
+          <a:effectRef idx="0">
+            <a:schemeClr val="accent1"/>
+          </a:effectRef>
+          <a:fontRef idx="minor">
+            <a:schemeClr val="tx1"/>
+          </a:fontRef>
+        </p:style>
+      </p:cxnSp>
+      <p:cxnSp>
+        <p:nvCxnSpPr>
+          <p:cNvPr id="3128" name="Straight Connector 3127">
+            <a:extLst>
+              <a:ext uri="{FF2B5EF4-FFF2-40B4-BE49-F238E27FC236}">
+                <a16:creationId xmlns:a16="http://schemas.microsoft.com/office/drawing/2014/main" id="{91F8C16F-1C59-30F1-C30D-583360D6761F}"/>
+              </a:ext>
+            </a:extLst>
+          </p:cNvPr>
+          <p:cNvCxnSpPr>
+            <a:cxnSpLocks/>
+            <a:stCxn id="3106" idx="6"/>
+            <a:endCxn id="3109" idx="2"/>
+          </p:cNvCxnSpPr>
+          <p:nvPr/>
+        </p:nvCxnSpPr>
+        <p:spPr>
+          <a:xfrm flipV="1">
+            <a:off x="6351160" y="14097687"/>
+            <a:ext cx="936104" cy="319446"/>
+          </a:xfrm>
+          <a:prstGeom prst="line">
+            <a:avLst/>
+          </a:prstGeom>
+        </p:spPr>
+        <p:style>
+          <a:lnRef idx="1">
+            <a:schemeClr val="accent1"/>
+          </a:lnRef>
+          <a:fillRef idx="0">
+            <a:schemeClr val="accent1"/>
+          </a:fillRef>
+          <a:effectRef idx="0">
+            <a:schemeClr val="accent1"/>
+          </a:effectRef>
+          <a:fontRef idx="minor">
+            <a:schemeClr val="tx1"/>
+          </a:fontRef>
+        </p:style>
+      </p:cxnSp>
+      <p:cxnSp>
+        <p:nvCxnSpPr>
+          <p:cNvPr id="3131" name="Straight Connector 3130">
+            <a:extLst>
+              <a:ext uri="{FF2B5EF4-FFF2-40B4-BE49-F238E27FC236}">
+                <a16:creationId xmlns:a16="http://schemas.microsoft.com/office/drawing/2014/main" id="{D543C04C-0E69-9D24-28F0-C2C8CF4B9BA9}"/>
+              </a:ext>
+            </a:extLst>
+          </p:cNvPr>
+          <p:cNvCxnSpPr>
+            <a:cxnSpLocks/>
+            <a:stCxn id="3106" idx="5"/>
+            <a:endCxn id="3110" idx="2"/>
+          </p:cNvCxnSpPr>
+          <p:nvPr/>
+        </p:nvCxnSpPr>
+        <p:spPr>
+          <a:xfrm>
+            <a:off x="6307731" y="14521980"/>
+            <a:ext cx="979533" cy="231266"/>
+          </a:xfrm>
+          <a:prstGeom prst="line">
+            <a:avLst/>
+          </a:prstGeom>
+        </p:spPr>
+        <p:style>
+          <a:lnRef idx="1">
+            <a:schemeClr val="accent1"/>
+          </a:lnRef>
+          <a:fillRef idx="0">
+            <a:schemeClr val="accent1"/>
+          </a:fillRef>
+          <a:effectRef idx="0">
+            <a:schemeClr val="accent1"/>
+          </a:effectRef>
+          <a:fontRef idx="minor">
+            <a:schemeClr val="tx1"/>
+          </a:fontRef>
+        </p:style>
+      </p:cxnSp>
+      <p:cxnSp>
+        <p:nvCxnSpPr>
+          <p:cNvPr id="3135" name="Straight Connector 3134">
+            <a:extLst>
+              <a:ext uri="{FF2B5EF4-FFF2-40B4-BE49-F238E27FC236}">
+                <a16:creationId xmlns:a16="http://schemas.microsoft.com/office/drawing/2014/main" id="{7C25723E-3A14-C9E4-EA0E-710AE0EFEF21}"/>
+              </a:ext>
+            </a:extLst>
+          </p:cNvPr>
+          <p:cNvCxnSpPr>
+            <a:cxnSpLocks/>
+            <a:stCxn id="3106" idx="5"/>
+            <a:endCxn id="3111" idx="2"/>
+          </p:cNvCxnSpPr>
+          <p:nvPr/>
+        </p:nvCxnSpPr>
+        <p:spPr>
+          <a:xfrm>
+            <a:off x="6307731" y="14521980"/>
+            <a:ext cx="979533" cy="861418"/>
+          </a:xfrm>
+          <a:prstGeom prst="line">
+            <a:avLst/>
+          </a:prstGeom>
+        </p:spPr>
+        <p:style>
+          <a:lnRef idx="1">
+            <a:schemeClr val="accent1"/>
+          </a:lnRef>
+          <a:fillRef idx="0">
+            <a:schemeClr val="accent1"/>
+          </a:fillRef>
+          <a:effectRef idx="0">
+            <a:schemeClr val="accent1"/>
+          </a:effectRef>
+          <a:fontRef idx="minor">
+            <a:schemeClr val="tx1"/>
+          </a:fontRef>
+        </p:style>
+      </p:cxnSp>
+      <p:cxnSp>
+        <p:nvCxnSpPr>
+          <p:cNvPr id="3138" name="Straight Connector 3137">
+            <a:extLst>
+              <a:ext uri="{FF2B5EF4-FFF2-40B4-BE49-F238E27FC236}">
+                <a16:creationId xmlns:a16="http://schemas.microsoft.com/office/drawing/2014/main" id="{CAA471B2-0AE6-61D0-0BFB-8C5CBD7744CB}"/>
+              </a:ext>
+            </a:extLst>
+          </p:cNvPr>
+          <p:cNvCxnSpPr>
+            <a:cxnSpLocks/>
+            <a:stCxn id="3107" idx="7"/>
+            <a:endCxn id="3108" idx="3"/>
+          </p:cNvCxnSpPr>
+          <p:nvPr/>
+        </p:nvCxnSpPr>
+        <p:spPr>
+          <a:xfrm flipV="1">
+            <a:off x="6307731" y="13572382"/>
+            <a:ext cx="1022962" cy="1318823"/>
+          </a:xfrm>
+          <a:prstGeom prst="line">
+            <a:avLst/>
+          </a:prstGeom>
+        </p:spPr>
+        <p:style>
+          <a:lnRef idx="1">
+            <a:schemeClr val="accent1"/>
+          </a:lnRef>
+          <a:fillRef idx="0">
+            <a:schemeClr val="accent1"/>
+          </a:fillRef>
+          <a:effectRef idx="0">
+            <a:schemeClr val="accent1"/>
+          </a:effectRef>
+          <a:fontRef idx="minor">
+            <a:schemeClr val="tx1"/>
+          </a:fontRef>
+        </p:style>
+      </p:cxnSp>
+      <p:cxnSp>
+        <p:nvCxnSpPr>
+          <p:cNvPr id="3141" name="Straight Connector 3140">
+            <a:extLst>
+              <a:ext uri="{FF2B5EF4-FFF2-40B4-BE49-F238E27FC236}">
+                <a16:creationId xmlns:a16="http://schemas.microsoft.com/office/drawing/2014/main" id="{B4A42113-2759-27A2-21AC-FDDB88A9F749}"/>
+              </a:ext>
+            </a:extLst>
+          </p:cNvPr>
+          <p:cNvCxnSpPr>
+            <a:cxnSpLocks/>
+            <a:stCxn id="3107" idx="6"/>
+            <a:endCxn id="3109" idx="3"/>
+          </p:cNvCxnSpPr>
+          <p:nvPr/>
+        </p:nvCxnSpPr>
+        <p:spPr>
+          <a:xfrm flipV="1">
+            <a:off x="6351160" y="14202534"/>
+            <a:ext cx="979533" cy="793518"/>
+          </a:xfrm>
+          <a:prstGeom prst="line">
+            <a:avLst/>
+          </a:prstGeom>
+        </p:spPr>
+        <p:style>
+          <a:lnRef idx="1">
+            <a:schemeClr val="accent1"/>
+          </a:lnRef>
+          <a:fillRef idx="0">
+            <a:schemeClr val="accent1"/>
+          </a:fillRef>
+          <a:effectRef idx="0">
+            <a:schemeClr val="accent1"/>
+          </a:effectRef>
+          <a:fontRef idx="minor">
+            <a:schemeClr val="tx1"/>
+          </a:fontRef>
+        </p:style>
+      </p:cxnSp>
+      <p:cxnSp>
+        <p:nvCxnSpPr>
+          <p:cNvPr id="3144" name="Straight Connector 3143">
+            <a:extLst>
+              <a:ext uri="{FF2B5EF4-FFF2-40B4-BE49-F238E27FC236}">
+                <a16:creationId xmlns:a16="http://schemas.microsoft.com/office/drawing/2014/main" id="{7C818EB6-EF0F-D307-1C8F-59DA273F7238}"/>
+              </a:ext>
+            </a:extLst>
+          </p:cNvPr>
+          <p:cNvCxnSpPr>
+            <a:cxnSpLocks/>
+            <a:stCxn id="3107" idx="5"/>
+            <a:endCxn id="3110" idx="2"/>
+          </p:cNvCxnSpPr>
+          <p:nvPr/>
+        </p:nvCxnSpPr>
+        <p:spPr>
+          <a:xfrm flipV="1">
+            <a:off x="6307731" y="14753246"/>
+            <a:ext cx="979533" cy="347653"/>
+          </a:xfrm>
+          <a:prstGeom prst="line">
+            <a:avLst/>
+          </a:prstGeom>
+        </p:spPr>
+        <p:style>
+          <a:lnRef idx="1">
+            <a:schemeClr val="accent1"/>
+          </a:lnRef>
+          <a:fillRef idx="0">
+            <a:schemeClr val="accent1"/>
+          </a:fillRef>
+          <a:effectRef idx="0">
+            <a:schemeClr val="accent1"/>
+          </a:effectRef>
+          <a:fontRef idx="minor">
+            <a:schemeClr val="tx1"/>
+          </a:fontRef>
+        </p:style>
+      </p:cxnSp>
+      <p:cxnSp>
+        <p:nvCxnSpPr>
+          <p:cNvPr id="3147" name="Straight Connector 3146">
+            <a:extLst>
+              <a:ext uri="{FF2B5EF4-FFF2-40B4-BE49-F238E27FC236}">
+                <a16:creationId xmlns:a16="http://schemas.microsoft.com/office/drawing/2014/main" id="{5BA6A8B4-54C2-FA43-27CD-2444D1A57356}"/>
+              </a:ext>
+            </a:extLst>
+          </p:cNvPr>
+          <p:cNvCxnSpPr>
+            <a:cxnSpLocks/>
+            <a:stCxn id="3107" idx="5"/>
+            <a:endCxn id="3111" idx="3"/>
+          </p:cNvCxnSpPr>
+          <p:nvPr/>
+        </p:nvCxnSpPr>
+        <p:spPr>
+          <a:xfrm>
+            <a:off x="6307731" y="15100899"/>
+            <a:ext cx="1022962" cy="387346"/>
+          </a:xfrm>
+          <a:prstGeom prst="line">
+            <a:avLst/>
+          </a:prstGeom>
+        </p:spPr>
+        <p:style>
+          <a:lnRef idx="1">
+            <a:schemeClr val="accent1"/>
+          </a:lnRef>
+          <a:fillRef idx="0">
+            <a:schemeClr val="accent1"/>
+          </a:fillRef>
+          <a:effectRef idx="0">
+            <a:schemeClr val="accent1"/>
+          </a:effectRef>
+          <a:fontRef idx="minor">
+            <a:schemeClr val="tx1"/>
+          </a:fontRef>
+        </p:style>
+      </p:cxnSp>
+      <p:cxnSp>
+        <p:nvCxnSpPr>
+          <p:cNvPr id="3200" name="Straight Connector 3199">
+            <a:extLst>
+              <a:ext uri="{FF2B5EF4-FFF2-40B4-BE49-F238E27FC236}">
+                <a16:creationId xmlns:a16="http://schemas.microsoft.com/office/drawing/2014/main" id="{899E7489-5439-0440-E632-3D23E7D762B7}"/>
+              </a:ext>
+            </a:extLst>
+          </p:cNvPr>
+          <p:cNvCxnSpPr>
+            <a:cxnSpLocks/>
+            <a:stCxn id="3112" idx="1"/>
+            <a:endCxn id="3108" idx="6"/>
+          </p:cNvCxnSpPr>
+          <p:nvPr/>
+        </p:nvCxnSpPr>
+        <p:spPr>
+          <a:xfrm flipH="1" flipV="1">
+            <a:off x="7583816" y="13467535"/>
+            <a:ext cx="945541" cy="223785"/>
+          </a:xfrm>
+          <a:prstGeom prst="line">
+            <a:avLst/>
+          </a:prstGeom>
+        </p:spPr>
+        <p:style>
+          <a:lnRef idx="1">
+            <a:schemeClr val="accent1"/>
+          </a:lnRef>
+          <a:fillRef idx="0">
+            <a:schemeClr val="accent1"/>
+          </a:fillRef>
+          <a:effectRef idx="0">
+            <a:schemeClr val="accent1"/>
+          </a:effectRef>
+          <a:fontRef idx="minor">
+            <a:schemeClr val="tx1"/>
+          </a:fontRef>
+        </p:style>
+      </p:cxnSp>
+      <p:cxnSp>
+        <p:nvCxnSpPr>
+          <p:cNvPr id="3203" name="Straight Connector 3202">
+            <a:extLst>
+              <a:ext uri="{FF2B5EF4-FFF2-40B4-BE49-F238E27FC236}">
+                <a16:creationId xmlns:a16="http://schemas.microsoft.com/office/drawing/2014/main" id="{517D1C70-0F63-B835-5B0C-0AEC87DFEE09}"/>
+              </a:ext>
+            </a:extLst>
+          </p:cNvPr>
+          <p:cNvCxnSpPr>
+            <a:cxnSpLocks/>
+            <a:stCxn id="3113" idx="2"/>
+            <a:endCxn id="3108" idx="6"/>
+          </p:cNvCxnSpPr>
+          <p:nvPr/>
+        </p:nvCxnSpPr>
+        <p:spPr>
+          <a:xfrm flipH="1" flipV="1">
+            <a:off x="7583816" y="13467535"/>
+            <a:ext cx="902112" cy="927969"/>
+          </a:xfrm>
+          <a:prstGeom prst="line">
+            <a:avLst/>
+          </a:prstGeom>
+        </p:spPr>
+        <p:style>
+          <a:lnRef idx="1">
+            <a:schemeClr val="accent1"/>
+          </a:lnRef>
+          <a:fillRef idx="0">
+            <a:schemeClr val="accent1"/>
+          </a:fillRef>
+          <a:effectRef idx="0">
+            <a:schemeClr val="accent1"/>
+          </a:effectRef>
+          <a:fontRef idx="minor">
+            <a:schemeClr val="tx1"/>
+          </a:fontRef>
+        </p:style>
+      </p:cxnSp>
+      <p:cxnSp>
+        <p:nvCxnSpPr>
+          <p:cNvPr id="3206" name="Straight Connector 3205">
+            <a:extLst>
+              <a:ext uri="{FF2B5EF4-FFF2-40B4-BE49-F238E27FC236}">
+                <a16:creationId xmlns:a16="http://schemas.microsoft.com/office/drawing/2014/main" id="{289DB4EF-5283-A8DF-8344-5F6B3579C70C}"/>
+              </a:ext>
+            </a:extLst>
+          </p:cNvPr>
+          <p:cNvCxnSpPr>
+            <a:cxnSpLocks/>
+            <a:stCxn id="3114" idx="1"/>
+            <a:endCxn id="3108" idx="5"/>
+          </p:cNvCxnSpPr>
+          <p:nvPr/>
+        </p:nvCxnSpPr>
+        <p:spPr>
+          <a:xfrm flipH="1" flipV="1">
+            <a:off x="7540387" y="13572382"/>
+            <a:ext cx="988970" cy="1297194"/>
+          </a:xfrm>
+          <a:prstGeom prst="line">
+            <a:avLst/>
+          </a:prstGeom>
+        </p:spPr>
+        <p:style>
+          <a:lnRef idx="1">
+            <a:schemeClr val="accent1"/>
+          </a:lnRef>
+          <a:fillRef idx="0">
+            <a:schemeClr val="accent1"/>
+          </a:fillRef>
+          <a:effectRef idx="0">
+            <a:schemeClr val="accent1"/>
+          </a:effectRef>
+          <a:fontRef idx="minor">
+            <a:schemeClr val="tx1"/>
+          </a:fontRef>
+        </p:style>
+      </p:cxnSp>
+      <p:cxnSp>
+        <p:nvCxnSpPr>
+          <p:cNvPr id="3209" name="Straight Connector 3208">
+            <a:extLst>
+              <a:ext uri="{FF2B5EF4-FFF2-40B4-BE49-F238E27FC236}">
+                <a16:creationId xmlns:a16="http://schemas.microsoft.com/office/drawing/2014/main" id="{5C81C67F-2431-C3C9-9A09-02F449D1BF36}"/>
+              </a:ext>
+            </a:extLst>
+          </p:cNvPr>
+          <p:cNvCxnSpPr>
+            <a:cxnSpLocks/>
+            <a:stCxn id="3112" idx="1"/>
+            <a:endCxn id="3109" idx="7"/>
+          </p:cNvCxnSpPr>
+          <p:nvPr/>
+        </p:nvCxnSpPr>
+        <p:spPr>
+          <a:xfrm flipH="1">
+            <a:off x="7540387" y="13691320"/>
+            <a:ext cx="988970" cy="301520"/>
+          </a:xfrm>
+          <a:prstGeom prst="line">
+            <a:avLst/>
+          </a:prstGeom>
+        </p:spPr>
+        <p:style>
+          <a:lnRef idx="1">
+            <a:schemeClr val="accent1"/>
+          </a:lnRef>
+          <a:fillRef idx="0">
+            <a:schemeClr val="accent1"/>
+          </a:fillRef>
+          <a:effectRef idx="0">
+            <a:schemeClr val="accent1"/>
+          </a:effectRef>
+          <a:fontRef idx="minor">
+            <a:schemeClr val="tx1"/>
+          </a:fontRef>
+        </p:style>
+      </p:cxnSp>
+      <p:cxnSp>
+        <p:nvCxnSpPr>
+          <p:cNvPr id="3213" name="Straight Connector 3212">
+            <a:extLst>
+              <a:ext uri="{FF2B5EF4-FFF2-40B4-BE49-F238E27FC236}">
+                <a16:creationId xmlns:a16="http://schemas.microsoft.com/office/drawing/2014/main" id="{5761F7D3-306D-4493-F611-6F4B073A3A58}"/>
+              </a:ext>
+            </a:extLst>
+          </p:cNvPr>
+          <p:cNvCxnSpPr>
+            <a:cxnSpLocks/>
+            <a:stCxn id="3113" idx="2"/>
+            <a:endCxn id="3109" idx="6"/>
+          </p:cNvCxnSpPr>
+          <p:nvPr/>
+        </p:nvCxnSpPr>
+        <p:spPr>
+          <a:xfrm flipH="1" flipV="1">
+            <a:off x="7583816" y="14097687"/>
+            <a:ext cx="902112" cy="297817"/>
+          </a:xfrm>
+          <a:prstGeom prst="line">
+            <a:avLst/>
+          </a:prstGeom>
+        </p:spPr>
+        <p:style>
+          <a:lnRef idx="1">
+            <a:schemeClr val="accent1"/>
+          </a:lnRef>
+          <a:fillRef idx="0">
+            <a:schemeClr val="accent1"/>
+          </a:fillRef>
+          <a:effectRef idx="0">
+            <a:schemeClr val="accent1"/>
+          </a:effectRef>
+          <a:fontRef idx="minor">
+            <a:schemeClr val="tx1"/>
+          </a:fontRef>
+        </p:style>
+      </p:cxnSp>
+      <p:cxnSp>
+        <p:nvCxnSpPr>
+          <p:cNvPr id="3217" name="Straight Connector 3216">
+            <a:extLst>
+              <a:ext uri="{FF2B5EF4-FFF2-40B4-BE49-F238E27FC236}">
+                <a16:creationId xmlns:a16="http://schemas.microsoft.com/office/drawing/2014/main" id="{AB01D73B-7D35-3377-CA6E-F4F0DB3D7CFA}"/>
+              </a:ext>
+            </a:extLst>
+          </p:cNvPr>
+          <p:cNvCxnSpPr>
+            <a:cxnSpLocks/>
+            <a:stCxn id="3114" idx="1"/>
+            <a:endCxn id="3109" idx="5"/>
+          </p:cNvCxnSpPr>
+          <p:nvPr/>
+        </p:nvCxnSpPr>
+        <p:spPr>
+          <a:xfrm flipH="1" flipV="1">
+            <a:off x="7540387" y="14202534"/>
+            <a:ext cx="988970" cy="667042"/>
+          </a:xfrm>
+          <a:prstGeom prst="line">
+            <a:avLst/>
+          </a:prstGeom>
+        </p:spPr>
+        <p:style>
+          <a:lnRef idx="1">
+            <a:schemeClr val="accent1"/>
+          </a:lnRef>
+          <a:fillRef idx="0">
+            <a:schemeClr val="accent1"/>
+          </a:fillRef>
+          <a:effectRef idx="0">
+            <a:schemeClr val="accent1"/>
+          </a:effectRef>
+          <a:fontRef idx="minor">
+            <a:schemeClr val="tx1"/>
+          </a:fontRef>
+        </p:style>
+      </p:cxnSp>
+      <p:cxnSp>
+        <p:nvCxnSpPr>
+          <p:cNvPr id="3223" name="Straight Connector 3222">
+            <a:extLst>
+              <a:ext uri="{FF2B5EF4-FFF2-40B4-BE49-F238E27FC236}">
+                <a16:creationId xmlns:a16="http://schemas.microsoft.com/office/drawing/2014/main" id="{8F48B3D7-A27A-38E7-9EEC-4C241FCA0995}"/>
+              </a:ext>
+            </a:extLst>
+          </p:cNvPr>
+          <p:cNvCxnSpPr>
+            <a:cxnSpLocks/>
+            <a:stCxn id="3112" idx="3"/>
+            <a:endCxn id="3110" idx="7"/>
+          </p:cNvCxnSpPr>
+          <p:nvPr/>
+        </p:nvCxnSpPr>
+        <p:spPr>
+          <a:xfrm flipH="1">
+            <a:off x="7540387" y="13901014"/>
+            <a:ext cx="988970" cy="747385"/>
+          </a:xfrm>
+          <a:prstGeom prst="line">
+            <a:avLst/>
+          </a:prstGeom>
+        </p:spPr>
+        <p:style>
+          <a:lnRef idx="1">
+            <a:schemeClr val="accent1"/>
+          </a:lnRef>
+          <a:fillRef idx="0">
+            <a:schemeClr val="accent1"/>
+          </a:fillRef>
+          <a:effectRef idx="0">
+            <a:schemeClr val="accent1"/>
+          </a:effectRef>
+          <a:fontRef idx="minor">
+            <a:schemeClr val="tx1"/>
+          </a:fontRef>
+        </p:style>
+      </p:cxnSp>
+      <p:cxnSp>
+        <p:nvCxnSpPr>
+          <p:cNvPr id="3226" name="Straight Connector 3225">
+            <a:extLst>
+              <a:ext uri="{FF2B5EF4-FFF2-40B4-BE49-F238E27FC236}">
+                <a16:creationId xmlns:a16="http://schemas.microsoft.com/office/drawing/2014/main" id="{6E901C62-0C72-C33B-360A-95884AA7E960}"/>
+              </a:ext>
+            </a:extLst>
+          </p:cNvPr>
+          <p:cNvCxnSpPr>
+            <a:cxnSpLocks/>
+            <a:stCxn id="3113" idx="3"/>
+            <a:endCxn id="3110" idx="6"/>
+          </p:cNvCxnSpPr>
+          <p:nvPr/>
+        </p:nvCxnSpPr>
+        <p:spPr>
+          <a:xfrm flipH="1">
+            <a:off x="7583816" y="14500351"/>
+            <a:ext cx="945541" cy="252895"/>
+          </a:xfrm>
+          <a:prstGeom prst="line">
+            <a:avLst/>
+          </a:prstGeom>
+        </p:spPr>
+        <p:style>
+          <a:lnRef idx="1">
+            <a:schemeClr val="accent1"/>
+          </a:lnRef>
+          <a:fillRef idx="0">
+            <a:schemeClr val="accent1"/>
+          </a:fillRef>
+          <a:effectRef idx="0">
+            <a:schemeClr val="accent1"/>
+          </a:effectRef>
+          <a:fontRef idx="minor">
+            <a:schemeClr val="tx1"/>
+          </a:fontRef>
+        </p:style>
+      </p:cxnSp>
+      <p:cxnSp>
+        <p:nvCxnSpPr>
+          <p:cNvPr id="3229" name="Straight Connector 3228">
+            <a:extLst>
+              <a:ext uri="{FF2B5EF4-FFF2-40B4-BE49-F238E27FC236}">
+                <a16:creationId xmlns:a16="http://schemas.microsoft.com/office/drawing/2014/main" id="{9A81A8A6-4E24-CFDE-BC23-8335F4133C56}"/>
+              </a:ext>
+            </a:extLst>
+          </p:cNvPr>
+          <p:cNvCxnSpPr>
+            <a:cxnSpLocks/>
+            <a:stCxn id="3114" idx="2"/>
+            <a:endCxn id="3110" idx="6"/>
+          </p:cNvCxnSpPr>
+          <p:nvPr/>
+        </p:nvCxnSpPr>
+        <p:spPr>
+          <a:xfrm flipH="1" flipV="1">
+            <a:off x="7583816" y="14753246"/>
+            <a:ext cx="902112" cy="221177"/>
+          </a:xfrm>
+          <a:prstGeom prst="line">
+            <a:avLst/>
+          </a:prstGeom>
+        </p:spPr>
+        <p:style>
+          <a:lnRef idx="1">
+            <a:schemeClr val="accent1"/>
+          </a:lnRef>
+          <a:fillRef idx="0">
+            <a:schemeClr val="accent1"/>
+          </a:fillRef>
+          <a:effectRef idx="0">
+            <a:schemeClr val="accent1"/>
+          </a:effectRef>
+          <a:fontRef idx="minor">
+            <a:schemeClr val="tx1"/>
+          </a:fontRef>
+        </p:style>
+      </p:cxnSp>
+      <p:cxnSp>
+        <p:nvCxnSpPr>
+          <p:cNvPr id="3233" name="Straight Connector 3232">
+            <a:extLst>
+              <a:ext uri="{FF2B5EF4-FFF2-40B4-BE49-F238E27FC236}">
+                <a16:creationId xmlns:a16="http://schemas.microsoft.com/office/drawing/2014/main" id="{D5F6009B-0188-020D-BF5A-9275DDD55982}"/>
+              </a:ext>
+            </a:extLst>
+          </p:cNvPr>
+          <p:cNvCxnSpPr>
+            <a:cxnSpLocks/>
+            <a:stCxn id="3112" idx="4"/>
+            <a:endCxn id="3111" idx="7"/>
+          </p:cNvCxnSpPr>
+          <p:nvPr/>
+        </p:nvCxnSpPr>
+        <p:spPr>
+          <a:xfrm flipH="1">
+            <a:off x="7540387" y="13944443"/>
+            <a:ext cx="1093817" cy="1334108"/>
+          </a:xfrm>
+          <a:prstGeom prst="line">
+            <a:avLst/>
+          </a:prstGeom>
+        </p:spPr>
+        <p:style>
+          <a:lnRef idx="1">
+            <a:schemeClr val="accent1"/>
+          </a:lnRef>
+          <a:fillRef idx="0">
+            <a:schemeClr val="accent1"/>
+          </a:fillRef>
+          <a:effectRef idx="0">
+            <a:schemeClr val="accent1"/>
+          </a:effectRef>
+          <a:fontRef idx="minor">
+            <a:schemeClr val="tx1"/>
+          </a:fontRef>
+        </p:style>
+      </p:cxnSp>
+      <p:cxnSp>
+        <p:nvCxnSpPr>
+          <p:cNvPr id="3236" name="Straight Connector 3235">
+            <a:extLst>
+              <a:ext uri="{FF2B5EF4-FFF2-40B4-BE49-F238E27FC236}">
+                <a16:creationId xmlns:a16="http://schemas.microsoft.com/office/drawing/2014/main" id="{87409CF6-1B1C-72F1-74E5-25A1B85D1AA4}"/>
+              </a:ext>
+            </a:extLst>
+          </p:cNvPr>
+          <p:cNvCxnSpPr>
+            <a:cxnSpLocks/>
+            <a:stCxn id="3113" idx="3"/>
+            <a:endCxn id="3111" idx="6"/>
+          </p:cNvCxnSpPr>
+          <p:nvPr/>
+        </p:nvCxnSpPr>
+        <p:spPr>
+          <a:xfrm flipH="1">
+            <a:off x="7583816" y="14500351"/>
+            <a:ext cx="945541" cy="883047"/>
+          </a:xfrm>
+          <a:prstGeom prst="line">
+            <a:avLst/>
+          </a:prstGeom>
+        </p:spPr>
+        <p:style>
+          <a:lnRef idx="1">
+            <a:schemeClr val="accent1"/>
+          </a:lnRef>
+          <a:fillRef idx="0">
+            <a:schemeClr val="accent1"/>
+          </a:fillRef>
+          <a:effectRef idx="0">
+            <a:schemeClr val="accent1"/>
+          </a:effectRef>
+          <a:fontRef idx="minor">
+            <a:schemeClr val="tx1"/>
+          </a:fontRef>
+        </p:style>
+      </p:cxnSp>
+      <p:cxnSp>
+        <p:nvCxnSpPr>
+          <p:cNvPr id="3239" name="Straight Connector 3238">
+            <a:extLst>
+              <a:ext uri="{FF2B5EF4-FFF2-40B4-BE49-F238E27FC236}">
+                <a16:creationId xmlns:a16="http://schemas.microsoft.com/office/drawing/2014/main" id="{D4D1734F-F9AE-70D0-259C-37D7D35BCE95}"/>
+              </a:ext>
+            </a:extLst>
+          </p:cNvPr>
+          <p:cNvCxnSpPr>
+            <a:cxnSpLocks/>
+            <a:stCxn id="3114" idx="2"/>
+            <a:endCxn id="3111" idx="5"/>
+          </p:cNvCxnSpPr>
+          <p:nvPr/>
+        </p:nvCxnSpPr>
+        <p:spPr>
+          <a:xfrm flipH="1">
+            <a:off x="7540387" y="14974423"/>
+            <a:ext cx="945541" cy="513822"/>
+          </a:xfrm>
+          <a:prstGeom prst="line">
+            <a:avLst/>
+          </a:prstGeom>
+        </p:spPr>
+        <p:style>
+          <a:lnRef idx="1">
+            <a:schemeClr val="accent1"/>
+          </a:lnRef>
+          <a:fillRef idx="0">
+            <a:schemeClr val="accent1"/>
+          </a:fillRef>
+          <a:effectRef idx="0">
+            <a:schemeClr val="accent1"/>
+          </a:effectRef>
+          <a:fontRef idx="minor">
+            <a:schemeClr val="tx1"/>
+          </a:fontRef>
+        </p:style>
+      </p:cxnSp>
+      <p:sp>
+        <p:nvSpPr>
+          <p:cNvPr id="3244" name="Text Box 37">
+            <a:extLst>
+              <a:ext uri="{FF2B5EF4-FFF2-40B4-BE49-F238E27FC236}">
+                <a16:creationId xmlns:a16="http://schemas.microsoft.com/office/drawing/2014/main" id="{6C089FD4-DA59-63BD-F347-E9B8E616D8FA}"/>
+              </a:ext>
+            </a:extLst>
+          </p:cNvPr>
+          <p:cNvSpPr txBox="1"/>
+          <p:nvPr/>
+        </p:nvSpPr>
+        <p:spPr>
+          <a:xfrm>
+            <a:off x="6047161" y="15767876"/>
+            <a:ext cx="2986452" cy="947225"/>
+          </a:xfrm>
+          <a:prstGeom prst="rect">
+            <a:avLst/>
+          </a:prstGeom>
+          <a:noFill/>
+          <a:ln w="6350">
+            <a:noFill/>
+          </a:ln>
+        </p:spPr>
+        <p:txBody>
+          <a:bodyPr rot="0" spcFirstLastPara="0" vert="horz" wrap="square" lIns="91440" tIns="45720" rIns="91440" bIns="45720" numCol="1" spcCol="0" rtlCol="0" fromWordArt="0" anchor="t" anchorCtr="0" forceAA="0" compatLnSpc="1">
+            <a:prstTxWarp prst="textNoShape">
+              <a:avLst/>
+            </a:prstTxWarp>
+            <a:noAutofit/>
+          </a:bodyPr>
+          <a:lstStyle/>
+          <a:p>
+            <a:pPr>
+              <a:lnSpc>
+                <a:spcPct val="107000"/>
+              </a:lnSpc>
+              <a:spcAft>
+                <a:spcPts val="800"/>
+              </a:spcAft>
+            </a:pPr>
+            <a:r>
+              <a:rPr lang="en-MY" sz="2400" dirty="0">
+                <a:latin typeface="Arial" panose="020B0604020202020204" pitchFamily="34" charset="0"/>
+                <a:ea typeface="DengXian" panose="02010600030101010101" pitchFamily="2" charset="-122"/>
+                <a:cs typeface="Arial" panose="020B0604020202020204" pitchFamily="34" charset="0"/>
+              </a:rPr>
+              <a:t>     </a:t>
+            </a:r>
+            <a:r>
+              <a:rPr lang="en-MY" sz="2400" b="1" dirty="0">
+                <a:latin typeface="Arial" panose="020B0604020202020204" pitchFamily="34" charset="0"/>
+                <a:ea typeface="DengXian" panose="02010600030101010101" pitchFamily="2" charset="-122"/>
+                <a:cs typeface="Arial" panose="020B0604020202020204" pitchFamily="34" charset="0"/>
+              </a:rPr>
+              <a:t>VideoPose3D</a:t>
+            </a:r>
+            <a:br>
+              <a:rPr lang="en-MY" sz="2400" dirty="0">
+                <a:latin typeface="Arial" panose="020B0604020202020204" pitchFamily="34" charset="0"/>
+                <a:ea typeface="DengXian" panose="02010600030101010101" pitchFamily="2" charset="-122"/>
+                <a:cs typeface="Arial" panose="020B0604020202020204" pitchFamily="34" charset="0"/>
+              </a:rPr>
+            </a:br>
+            <a:r>
+              <a:rPr lang="en-MY" sz="2400" dirty="0">
+                <a:latin typeface="Arial" panose="020B0604020202020204" pitchFamily="34" charset="0"/>
+                <a:ea typeface="DengXian" panose="02010600030101010101" pitchFamily="2" charset="-122"/>
+                <a:cs typeface="Arial" panose="020B0604020202020204" pitchFamily="34" charset="0"/>
+              </a:rPr>
+              <a:t>3D Pose </a:t>
+            </a:r>
+            <a:r>
+              <a:rPr lang="en-US" altLang="zh-CN" sz="2400" dirty="0">
+                <a:latin typeface="Arial" panose="020B0604020202020204" pitchFamily="34" charset="0"/>
+                <a:ea typeface="DengXian" panose="02010600030101010101" pitchFamily="2" charset="-122"/>
+                <a:cs typeface="Arial" panose="020B0604020202020204" pitchFamily="34" charset="0"/>
+              </a:rPr>
+              <a:t>Estimation</a:t>
+            </a:r>
+            <a:endParaRPr lang="en-US" sz="2400" dirty="0">
+              <a:effectLst/>
+              <a:latin typeface="Arial" panose="020B0604020202020204" pitchFamily="34" charset="0"/>
+              <a:ea typeface="DengXian" panose="02010600030101010101" pitchFamily="2" charset="-122"/>
+              <a:cs typeface="Arial" panose="020B0604020202020204" pitchFamily="34" charset="0"/>
+            </a:endParaRPr>
+          </a:p>
+        </p:txBody>
+      </p:sp>
+      <p:sp>
+        <p:nvSpPr>
+          <p:cNvPr id="3245" name="Arrow: Right 3244">
+            <a:extLst>
+              <a:ext uri="{FF2B5EF4-FFF2-40B4-BE49-F238E27FC236}">
+                <a16:creationId xmlns:a16="http://schemas.microsoft.com/office/drawing/2014/main" id="{4E3B2291-0C2D-A9AF-4864-4E14B292F373}"/>
+              </a:ext>
+            </a:extLst>
+          </p:cNvPr>
+          <p:cNvSpPr/>
+          <p:nvPr/>
+        </p:nvSpPr>
+        <p:spPr>
+          <a:xfrm>
+            <a:off x="9300691" y="14211609"/>
+            <a:ext cx="1656184" cy="806610"/>
+          </a:xfrm>
+          <a:prstGeom prst="rightArrow">
+            <a:avLst/>
+          </a:prstGeom>
+          <a:solidFill>
+            <a:schemeClr val="accent1">
+              <a:lumMod val="20000"/>
+              <a:lumOff val="80000"/>
+            </a:schemeClr>
+          </a:solidFill>
+          <a:ln>
+            <a:solidFill>
+              <a:schemeClr val="accent1">
+                <a:lumMod val="20000"/>
+                <a:lumOff val="80000"/>
+              </a:schemeClr>
+            </a:solidFill>
+          </a:ln>
+        </p:spPr>
+        <p:style>
+          <a:lnRef idx="2">
+            <a:schemeClr val="accent1">
+              <a:shade val="50000"/>
+            </a:schemeClr>
+          </a:lnRef>
+          <a:fillRef idx="1">
+            <a:schemeClr val="accent1"/>
+          </a:fillRef>
+          <a:effectRef idx="0">
+            <a:schemeClr val="accent1"/>
+          </a:effectRef>
+          <a:fontRef idx="minor">
+            <a:schemeClr val="lt1"/>
+          </a:fontRef>
+        </p:style>
+        <p:txBody>
+          <a:bodyPr rtlCol="0" anchor="ctr"/>
+          <a:lstStyle/>
+          <a:p>
+            <a:pPr algn="ctr"/>
+            <a:endParaRPr lang="en-US"/>
+          </a:p>
+        </p:txBody>
+      </p:sp>
+      <p:pic>
+        <p:nvPicPr>
+          <p:cNvPr id="3246" name="Picture 3245">
+            <a:extLst>
+              <a:ext uri="{FF2B5EF4-FFF2-40B4-BE49-F238E27FC236}">
+                <a16:creationId xmlns:a16="http://schemas.microsoft.com/office/drawing/2014/main" id="{037F9257-0CAF-E6D9-07D8-A5617E3A4BD4}"/>
+              </a:ext>
+            </a:extLst>
+          </p:cNvPr>
+          <p:cNvPicPr>
+            <a:picLocks noChangeAspect="1"/>
+          </p:cNvPicPr>
+          <p:nvPr/>
+        </p:nvPicPr>
+        <p:blipFill rotWithShape="1">
+          <a:blip r:embed="rId7"/>
+          <a:srcRect l="10230" r="10756"/>
+          <a:stretch/>
+        </p:blipFill>
+        <p:spPr>
+          <a:xfrm>
+            <a:off x="13446743" y="13269196"/>
+            <a:ext cx="2051261" cy="2382959"/>
+          </a:xfrm>
+          <a:prstGeom prst="rect">
+            <a:avLst/>
+          </a:prstGeom>
+        </p:spPr>
+      </p:pic>
+      <p:pic>
+        <p:nvPicPr>
+          <p:cNvPr id="3247" name="Picture 3246">
+            <a:extLst>
+              <a:ext uri="{FF2B5EF4-FFF2-40B4-BE49-F238E27FC236}">
+                <a16:creationId xmlns:a16="http://schemas.microsoft.com/office/drawing/2014/main" id="{10602986-D533-E4D4-EBFF-AD8A15F5805A}"/>
+              </a:ext>
+            </a:extLst>
+          </p:cNvPr>
+          <p:cNvPicPr>
+            <a:picLocks noChangeAspect="1"/>
+          </p:cNvPicPr>
+          <p:nvPr/>
+        </p:nvPicPr>
+        <p:blipFill>
+          <a:blip r:embed="rId8"/>
+          <a:stretch>
+            <a:fillRect/>
+          </a:stretch>
+        </p:blipFill>
+        <p:spPr>
+          <a:xfrm>
+            <a:off x="11214495" y="13267779"/>
+            <a:ext cx="2125974" cy="2382959"/>
+          </a:xfrm>
+          <a:prstGeom prst="rect">
+            <a:avLst/>
+          </a:prstGeom>
+        </p:spPr>
+      </p:pic>
+      <p:sp>
+        <p:nvSpPr>
+          <p:cNvPr id="3248" name="Text Box 36">
+            <a:extLst>
+              <a:ext uri="{FF2B5EF4-FFF2-40B4-BE49-F238E27FC236}">
+                <a16:creationId xmlns:a16="http://schemas.microsoft.com/office/drawing/2014/main" id="{F4180331-029C-B0D6-29B7-078AD2B4663F}"/>
+              </a:ext>
+            </a:extLst>
+          </p:cNvPr>
+          <p:cNvSpPr txBox="1"/>
+          <p:nvPr/>
+        </p:nvSpPr>
+        <p:spPr>
+          <a:xfrm>
+            <a:off x="11571133" y="15767876"/>
+            <a:ext cx="3671349" cy="540545"/>
+          </a:xfrm>
+          <a:prstGeom prst="rect">
+            <a:avLst/>
+          </a:prstGeom>
+          <a:noFill/>
+          <a:ln w="6350">
+            <a:noFill/>
+          </a:ln>
+        </p:spPr>
+        <p:txBody>
+          <a:bodyPr rot="0" spcFirstLastPara="0" vert="horz" wrap="square" lIns="91440" tIns="45720" rIns="91440" bIns="45720" numCol="1" spcCol="0" rtlCol="0" fromWordArt="0" anchor="t" anchorCtr="0" forceAA="0" compatLnSpc="1">
+            <a:prstTxWarp prst="textNoShape">
+              <a:avLst/>
+            </a:prstTxWarp>
+            <a:noAutofit/>
+          </a:bodyPr>
+          <a:lstStyle/>
+          <a:p>
+            <a:pPr>
+              <a:lnSpc>
+                <a:spcPct val="107000"/>
+              </a:lnSpc>
+              <a:spcAft>
+                <a:spcPts val="800"/>
+              </a:spcAft>
+            </a:pPr>
+            <a:r>
+              <a:rPr lang="en-MY" sz="2400" dirty="0">
+                <a:effectLst/>
+                <a:latin typeface="Arial" panose="020B0604020202020204" pitchFamily="34" charset="0"/>
+                <a:ea typeface="DengXian" panose="02010600030101010101" pitchFamily="2" charset="-122"/>
+                <a:cs typeface="Arial" panose="020B0604020202020204" pitchFamily="34" charset="0"/>
+              </a:rPr>
+              <a:t> Biomechanics Analysis</a:t>
+            </a:r>
+            <a:endParaRPr lang="en-US" sz="2400" dirty="0">
+              <a:effectLst/>
+              <a:latin typeface="Arial" panose="020B0604020202020204" pitchFamily="34" charset="0"/>
+              <a:ea typeface="DengXian" panose="02010600030101010101" pitchFamily="2" charset="-122"/>
+              <a:cs typeface="Arial" panose="020B0604020202020204" pitchFamily="34" charset="0"/>
+            </a:endParaRPr>
+          </a:p>
+        </p:txBody>
+      </p:sp>
+      <p:sp>
+        <p:nvSpPr>
+          <p:cNvPr id="3249" name="Arrow: Right 3248">
+            <a:extLst>
+              <a:ext uri="{FF2B5EF4-FFF2-40B4-BE49-F238E27FC236}">
+                <a16:creationId xmlns:a16="http://schemas.microsoft.com/office/drawing/2014/main" id="{514F9019-5F1A-6A11-3232-1084863108DB}"/>
+              </a:ext>
+            </a:extLst>
+          </p:cNvPr>
+          <p:cNvSpPr/>
+          <p:nvPr/>
+        </p:nvSpPr>
+        <p:spPr>
+          <a:xfrm>
+            <a:off x="15877976" y="14261369"/>
+            <a:ext cx="1656184" cy="806610"/>
+          </a:xfrm>
+          <a:prstGeom prst="rightArrow">
+            <a:avLst/>
+          </a:prstGeom>
+          <a:solidFill>
+            <a:schemeClr val="accent1">
+              <a:lumMod val="20000"/>
+              <a:lumOff val="80000"/>
+            </a:schemeClr>
+          </a:solidFill>
+          <a:ln>
+            <a:solidFill>
+              <a:schemeClr val="accent1">
+                <a:lumMod val="20000"/>
+                <a:lumOff val="80000"/>
+              </a:schemeClr>
+            </a:solidFill>
+          </a:ln>
+        </p:spPr>
+        <p:style>
+          <a:lnRef idx="2">
+            <a:schemeClr val="accent1">
+              <a:shade val="50000"/>
+            </a:schemeClr>
+          </a:lnRef>
+          <a:fillRef idx="1">
+            <a:schemeClr val="accent1"/>
+          </a:fillRef>
+          <a:effectRef idx="0">
+            <a:schemeClr val="accent1"/>
+          </a:effectRef>
+          <a:fontRef idx="minor">
+            <a:schemeClr val="lt1"/>
+          </a:fontRef>
+        </p:style>
+        <p:txBody>
+          <a:bodyPr rtlCol="0" anchor="ctr"/>
+          <a:lstStyle/>
+          <a:p>
+            <a:pPr algn="ctr"/>
+            <a:endParaRPr lang="en-US"/>
+          </a:p>
+        </p:txBody>
+      </p:sp>
+      <p:cxnSp>
+        <p:nvCxnSpPr>
+          <p:cNvPr id="3251" name="Straight Connector 3250">
+            <a:extLst>
+              <a:ext uri="{FF2B5EF4-FFF2-40B4-BE49-F238E27FC236}">
+                <a16:creationId xmlns:a16="http://schemas.microsoft.com/office/drawing/2014/main" id="{533DE830-08F9-EE18-9B86-3729FEB66E02}"/>
+              </a:ext>
+            </a:extLst>
+          </p:cNvPr>
+          <p:cNvCxnSpPr/>
+          <p:nvPr/>
+        </p:nvCxnSpPr>
+        <p:spPr>
+          <a:xfrm>
+            <a:off x="2789605" y="15368685"/>
+            <a:ext cx="459389" cy="0"/>
+          </a:xfrm>
+          <a:prstGeom prst="line">
+            <a:avLst/>
+          </a:prstGeom>
+          <a:ln>
+            <a:solidFill>
+              <a:schemeClr val="tx1"/>
+            </a:solidFill>
+          </a:ln>
+        </p:spPr>
+        <p:style>
+          <a:lnRef idx="1">
+            <a:schemeClr val="accent1"/>
+          </a:lnRef>
+          <a:fillRef idx="0">
+            <a:schemeClr val="accent1"/>
+          </a:fillRef>
+          <a:effectRef idx="0">
+            <a:schemeClr val="accent1"/>
+          </a:effectRef>
+          <a:fontRef idx="minor">
+            <a:schemeClr val="tx1"/>
+          </a:fontRef>
+        </p:style>
+      </p:cxnSp>
+      <p:pic>
+        <p:nvPicPr>
+          <p:cNvPr id="3253" name="Picture 3252" descr="A picture containing text, night sky&#10;&#10;Description automatically generated">
+            <a:extLst>
+              <a:ext uri="{FF2B5EF4-FFF2-40B4-BE49-F238E27FC236}">
+                <a16:creationId xmlns:a16="http://schemas.microsoft.com/office/drawing/2014/main" id="{843D86A4-B54E-BB82-37BD-7A1ABE583C97}"/>
+              </a:ext>
+            </a:extLst>
+          </p:cNvPr>
+          <p:cNvPicPr>
+            <a:picLocks noChangeAspect="1"/>
+          </p:cNvPicPr>
+          <p:nvPr/>
+        </p:nvPicPr>
+        <p:blipFill rotWithShape="1">
+          <a:blip r:embed="rId9">
+            <a:extLst>
+              <a:ext uri="{28A0092B-C50C-407E-A947-70E740481C1C}">
+                <a14:useLocalDpi xmlns:a14="http://schemas.microsoft.com/office/drawing/2010/main" val="0"/>
+              </a:ext>
+            </a:extLst>
+          </a:blip>
+          <a:srcRect b="10650"/>
+          <a:stretch/>
+        </p:blipFill>
+        <p:spPr>
+          <a:xfrm>
+            <a:off x="17542447" y="12903942"/>
+            <a:ext cx="3088057" cy="2971417"/>
+          </a:xfrm>
+          <a:prstGeom prst="rect">
+            <a:avLst/>
+          </a:prstGeom>
+        </p:spPr>
+      </p:pic>
+      <p:sp>
+        <p:nvSpPr>
+          <p:cNvPr id="3254" name="Text Box 37">
+            <a:extLst>
+              <a:ext uri="{FF2B5EF4-FFF2-40B4-BE49-F238E27FC236}">
+                <a16:creationId xmlns:a16="http://schemas.microsoft.com/office/drawing/2014/main" id="{5154A0A8-E8AE-DB3D-6D28-A7353059C048}"/>
+              </a:ext>
+            </a:extLst>
+          </p:cNvPr>
+          <p:cNvSpPr txBox="1"/>
+          <p:nvPr/>
+        </p:nvSpPr>
+        <p:spPr>
+          <a:xfrm>
+            <a:off x="18227060" y="15903548"/>
+            <a:ext cx="1728192" cy="849277"/>
+          </a:xfrm>
+          <a:prstGeom prst="rect">
+            <a:avLst/>
+          </a:prstGeom>
+          <a:noFill/>
+          <a:ln w="6350">
+            <a:noFill/>
+          </a:ln>
+        </p:spPr>
+        <p:txBody>
+          <a:bodyPr rot="0" spcFirstLastPara="0" vert="horz" wrap="square" lIns="91440" tIns="45720" rIns="91440" bIns="45720" numCol="1" spcCol="0" rtlCol="0" fromWordArt="0" anchor="t" anchorCtr="0" forceAA="0" compatLnSpc="1">
+            <a:prstTxWarp prst="textNoShape">
+              <a:avLst/>
+            </a:prstTxWarp>
+            <a:noAutofit/>
+          </a:bodyPr>
+          <a:lstStyle/>
+          <a:p>
+            <a:pPr>
+              <a:lnSpc>
+                <a:spcPct val="107000"/>
+              </a:lnSpc>
+              <a:spcAft>
+                <a:spcPts val="800"/>
+              </a:spcAft>
+            </a:pPr>
+            <a:r>
+              <a:rPr lang="en-MY" sz="2400" dirty="0">
+                <a:effectLst/>
+                <a:latin typeface="Arial" panose="020B0604020202020204" pitchFamily="34" charset="0"/>
+                <a:ea typeface="DengXian" panose="02010600030101010101" pitchFamily="2" charset="-122"/>
+                <a:cs typeface="Arial" panose="020B0604020202020204" pitchFamily="34" charset="0"/>
+              </a:rPr>
+              <a:t>Injury Risk Probability</a:t>
+            </a:r>
+            <a:endParaRPr lang="en-US" sz="2400" dirty="0">
+              <a:effectLst/>
+              <a:latin typeface="Arial" panose="020B0604020202020204" pitchFamily="34" charset="0"/>
+              <a:ea typeface="DengXian" panose="02010600030101010101" pitchFamily="2" charset="-122"/>
+              <a:cs typeface="Arial" panose="020B0604020202020204" pitchFamily="34" charset="0"/>
+            </a:endParaRPr>
+          </a:p>
+        </p:txBody>
+      </p:sp>
+      <p:sp>
+        <p:nvSpPr>
+          <p:cNvPr id="3256" name="Text Box 6">
+            <a:extLst>
+              <a:ext uri="{FF2B5EF4-FFF2-40B4-BE49-F238E27FC236}">
+                <a16:creationId xmlns:a16="http://schemas.microsoft.com/office/drawing/2014/main" id="{B1C96ABF-93AF-CDA8-CC80-0108D179C2DA}"/>
+              </a:ext>
+            </a:extLst>
+          </p:cNvPr>
+          <p:cNvSpPr txBox="1"/>
+          <p:nvPr/>
+        </p:nvSpPr>
+        <p:spPr>
+          <a:xfrm>
+            <a:off x="1252623" y="17107605"/>
+            <a:ext cx="1713817" cy="524314"/>
+          </a:xfrm>
+          <a:prstGeom prst="rect">
+            <a:avLst/>
+          </a:prstGeom>
+          <a:noFill/>
+          <a:ln w="6350">
+            <a:noFill/>
+          </a:ln>
+        </p:spPr>
+        <p:txBody>
+          <a:bodyPr rot="0" spcFirstLastPara="0" vert="horz" wrap="square" lIns="91440" tIns="45720" rIns="91440" bIns="45720" numCol="1" spcCol="0" rtlCol="0" fromWordArt="0" anchor="t" anchorCtr="0" forceAA="0" compatLnSpc="1">
+            <a:prstTxWarp prst="textNoShape">
+              <a:avLst/>
+            </a:prstTxWarp>
+            <a:noAutofit/>
+          </a:bodyPr>
+          <a:lstStyle/>
+          <a:p>
+            <a:pPr>
+              <a:lnSpc>
+                <a:spcPct val="107000"/>
+              </a:lnSpc>
+              <a:spcAft>
+                <a:spcPts val="800"/>
+              </a:spcAft>
+            </a:pPr>
+            <a:r>
+              <a:rPr lang="en-US" altLang="zh-CN" sz="2800" b="1" dirty="0">
+                <a:effectLst/>
+                <a:latin typeface="Arial" panose="020B0604020202020204" pitchFamily="34" charset="0"/>
+                <a:ea typeface="DengXian" panose="02010600030101010101" pitchFamily="2" charset="-122"/>
+                <a:cs typeface="Arial" panose="020B0604020202020204" pitchFamily="34" charset="0"/>
+              </a:rPr>
+              <a:t>Findings</a:t>
+            </a:r>
+            <a:endParaRPr lang="en-US" sz="2400" dirty="0">
+              <a:effectLst/>
+              <a:latin typeface="Arial" panose="020B0604020202020204" pitchFamily="34" charset="0"/>
+              <a:ea typeface="DengXian" panose="02010600030101010101" pitchFamily="2" charset="-122"/>
+              <a:cs typeface="Arial" panose="020B0604020202020204" pitchFamily="34" charset="0"/>
+            </a:endParaRPr>
+          </a:p>
+        </p:txBody>
+      </p:sp>
+      <p:pic>
+        <p:nvPicPr>
+          <p:cNvPr id="3257" name="Picture 3256" descr="A picture containing text&#10;&#10;Description automatically generated">
+            <a:extLst>
+              <a:ext uri="{FF2B5EF4-FFF2-40B4-BE49-F238E27FC236}">
+                <a16:creationId xmlns:a16="http://schemas.microsoft.com/office/drawing/2014/main" id="{668FD7A2-F930-04FE-90EB-FF13B1550FF3}"/>
+              </a:ext>
+            </a:extLst>
+          </p:cNvPr>
+          <p:cNvPicPr>
+            <a:picLocks noChangeAspect="1"/>
+          </p:cNvPicPr>
+          <p:nvPr/>
+        </p:nvPicPr>
+        <p:blipFill>
+          <a:blip r:embed="rId10">
+            <a:extLst>
+              <a:ext uri="{837473B0-CC2E-450A-ABE3-18F120FF3D39}">
+                <a1611:picAttrSrcUrl xmlns:a1611="http://schemas.microsoft.com/office/drawing/2016/11/main" r:id="rId11"/>
+              </a:ext>
+            </a:extLst>
+          </a:blip>
+          <a:stretch>
+            <a:fillRect/>
+          </a:stretch>
+        </p:blipFill>
+        <p:spPr>
+          <a:xfrm>
+            <a:off x="570508" y="16940187"/>
+            <a:ext cx="682115" cy="682115"/>
+          </a:xfrm>
+          <a:prstGeom prst="rect">
+            <a:avLst/>
+          </a:prstGeom>
+        </p:spPr>
+      </p:pic>
+      <p:sp>
+        <p:nvSpPr>
+          <p:cNvPr id="3263" name="TextBox 3262">
+            <a:extLst>
+              <a:ext uri="{FF2B5EF4-FFF2-40B4-BE49-F238E27FC236}">
+                <a16:creationId xmlns:a16="http://schemas.microsoft.com/office/drawing/2014/main" id="{B8E77E41-75E4-CDA9-28D4-63B9133DA717}"/>
+              </a:ext>
+            </a:extLst>
+          </p:cNvPr>
+          <p:cNvSpPr txBox="1"/>
+          <p:nvPr/>
+        </p:nvSpPr>
+        <p:spPr>
+          <a:xfrm>
+            <a:off x="756296" y="17804283"/>
+            <a:ext cx="20471150" cy="461665"/>
+          </a:xfrm>
+          <a:prstGeom prst="rect">
+            <a:avLst/>
+          </a:prstGeom>
+          <a:noFill/>
+        </p:spPr>
+        <p:txBody>
+          <a:bodyPr wrap="square">
+            <a:spAutoFit/>
+          </a:bodyPr>
+          <a:lstStyle/>
+          <a:p>
+            <a:pPr marL="457200" indent="-457200">
+              <a:buFont typeface="+mj-lt"/>
+              <a:buAutoNum type="arabicPeriod"/>
+            </a:pPr>
+            <a:r>
+              <a:rPr lang="en-MY" sz="2400" dirty="0">
+                <a:latin typeface="Arial" panose="020B0604020202020204" pitchFamily="34" charset="0"/>
+                <a:cs typeface="Arial" panose="020B0604020202020204" pitchFamily="34" charset="0"/>
+              </a:rPr>
+              <a:t>In Figure 1, notice that the spine angle value shows that the 3D reconstruction is quite reliable based only on image features.</a:t>
+            </a:r>
+          </a:p>
+        </p:txBody>
+      </p:sp>
+      <p:sp>
+        <p:nvSpPr>
+          <p:cNvPr id="3268" name="TextBox 3267">
+            <a:extLst>
+              <a:ext uri="{FF2B5EF4-FFF2-40B4-BE49-F238E27FC236}">
+                <a16:creationId xmlns:a16="http://schemas.microsoft.com/office/drawing/2014/main" id="{A0A75D16-CAFE-0A15-7191-4EBCA38F8235}"/>
+              </a:ext>
+            </a:extLst>
+          </p:cNvPr>
+          <p:cNvSpPr txBox="1"/>
+          <p:nvPr/>
+        </p:nvSpPr>
+        <p:spPr>
+          <a:xfrm>
+            <a:off x="756296" y="18359252"/>
+            <a:ext cx="20471150" cy="830997"/>
+          </a:xfrm>
+          <a:prstGeom prst="rect">
+            <a:avLst/>
+          </a:prstGeom>
+          <a:noFill/>
+        </p:spPr>
+        <p:txBody>
+          <a:bodyPr wrap="square">
+            <a:spAutoFit/>
+          </a:bodyPr>
+          <a:lstStyle/>
+          <a:p>
+            <a:pPr marL="457200" indent="-457200">
+              <a:buFont typeface="+mj-lt"/>
+              <a:buAutoNum type="arabicPeriod" startAt="2"/>
+            </a:pPr>
+            <a:r>
+              <a:rPr lang="en-US" sz="2400" dirty="0">
+                <a:latin typeface="Arial" panose="020B0604020202020204" pitchFamily="34" charset="0"/>
+                <a:cs typeface="Arial" panose="020B0604020202020204" pitchFamily="34" charset="0"/>
+              </a:rPr>
+              <a:t>Setting the load as 120N, the red curve in Figure 2 displays injury risk over 12 repetitions. It indicates an accumulation of risk and increasing danger with more repetitions, contrasting with the green curves remaining constant value of risk probability.</a:t>
+            </a:r>
+            <a:endParaRPr lang="en-MY" sz="2400" dirty="0">
+              <a:latin typeface="Arial" panose="020B0604020202020204" pitchFamily="34" charset="0"/>
+              <a:cs typeface="Arial" panose="020B0604020202020204" pitchFamily="34" charset="0"/>
+            </a:endParaRPr>
+          </a:p>
+        </p:txBody>
+      </p:sp>
+      <p:sp>
+        <p:nvSpPr>
+          <p:cNvPr id="3270" name="Text Box 6">
+            <a:extLst>
+              <a:ext uri="{FF2B5EF4-FFF2-40B4-BE49-F238E27FC236}">
+                <a16:creationId xmlns:a16="http://schemas.microsoft.com/office/drawing/2014/main" id="{C598B35F-6172-609B-96AE-71C538340122}"/>
+              </a:ext>
+            </a:extLst>
+          </p:cNvPr>
+          <p:cNvSpPr txBox="1"/>
+          <p:nvPr/>
+        </p:nvSpPr>
+        <p:spPr>
+          <a:xfrm>
+            <a:off x="1367020" y="24629050"/>
+            <a:ext cx="2142621" cy="524314"/>
+          </a:xfrm>
+          <a:prstGeom prst="rect">
+            <a:avLst/>
+          </a:prstGeom>
+          <a:noFill/>
+          <a:ln w="6350">
+            <a:noFill/>
+          </a:ln>
+        </p:spPr>
+        <p:txBody>
+          <a:bodyPr rot="0" spcFirstLastPara="0" vert="horz" wrap="square" lIns="91440" tIns="45720" rIns="91440" bIns="45720" numCol="1" spcCol="0" rtlCol="0" fromWordArt="0" anchor="t" anchorCtr="0" forceAA="0" compatLnSpc="1">
+            <a:prstTxWarp prst="textNoShape">
+              <a:avLst/>
+            </a:prstTxWarp>
+            <a:noAutofit/>
+          </a:bodyPr>
+          <a:lstStyle/>
+          <a:p>
+            <a:pPr>
+              <a:lnSpc>
+                <a:spcPct val="107000"/>
+              </a:lnSpc>
+              <a:spcAft>
+                <a:spcPts val="800"/>
+              </a:spcAft>
+            </a:pPr>
+            <a:r>
+              <a:rPr lang="en-US" altLang="zh-CN" sz="2800" b="1" dirty="0">
+                <a:effectLst/>
+                <a:latin typeface="Arial" panose="020B0604020202020204" pitchFamily="34" charset="0"/>
+                <a:ea typeface="DengXian" panose="02010600030101010101" pitchFamily="2" charset="-122"/>
+                <a:cs typeface="Arial" panose="020B0604020202020204" pitchFamily="34" charset="0"/>
+              </a:rPr>
+              <a:t>Conclusion</a:t>
+            </a:r>
+            <a:endParaRPr lang="en-US" sz="2400" dirty="0">
+              <a:effectLst/>
+              <a:latin typeface="Arial" panose="020B0604020202020204" pitchFamily="34" charset="0"/>
+              <a:ea typeface="DengXian" panose="02010600030101010101" pitchFamily="2" charset="-122"/>
+              <a:cs typeface="Arial" panose="020B0604020202020204" pitchFamily="34" charset="0"/>
+            </a:endParaRPr>
+          </a:p>
+        </p:txBody>
+      </p:sp>
+      <p:pic>
+        <p:nvPicPr>
+          <p:cNvPr id="3274" name="Picture 3273" descr="A picture containing dark, black, night sky&#10;&#10;Description automatically generated">
+            <a:extLst>
+              <a:ext uri="{FF2B5EF4-FFF2-40B4-BE49-F238E27FC236}">
+                <a16:creationId xmlns:a16="http://schemas.microsoft.com/office/drawing/2014/main" id="{9F09850E-A429-C535-7311-00598422F154}"/>
+              </a:ext>
+            </a:extLst>
+          </p:cNvPr>
+          <p:cNvPicPr>
+            <a:picLocks noChangeAspect="1"/>
+          </p:cNvPicPr>
+          <p:nvPr/>
+        </p:nvPicPr>
+        <p:blipFill>
+          <a:blip r:embed="rId12">
+            <a:extLst>
+              <a:ext uri="{28A0092B-C50C-407E-A947-70E740481C1C}">
+                <a14:useLocalDpi xmlns:a14="http://schemas.microsoft.com/office/drawing/2010/main" val="0"/>
+              </a:ext>
+            </a:extLst>
+          </a:blip>
+          <a:stretch>
+            <a:fillRect/>
+          </a:stretch>
+        </p:blipFill>
+        <p:spPr>
+          <a:xfrm>
+            <a:off x="727024" y="24501027"/>
+            <a:ext cx="717645" cy="717645"/>
+          </a:xfrm>
+          <a:prstGeom prst="rect">
+            <a:avLst/>
+          </a:prstGeom>
+        </p:spPr>
+      </p:pic>
+      <p:sp>
+        <p:nvSpPr>
+          <p:cNvPr id="3275" name="TextBox 3274">
+            <a:extLst>
+              <a:ext uri="{FF2B5EF4-FFF2-40B4-BE49-F238E27FC236}">
+                <a16:creationId xmlns:a16="http://schemas.microsoft.com/office/drawing/2014/main" id="{D18C3A82-6E0C-9CC6-C7A4-74AC902ABA45}"/>
+              </a:ext>
+            </a:extLst>
+          </p:cNvPr>
+          <p:cNvSpPr txBox="1"/>
+          <p:nvPr/>
+        </p:nvSpPr>
+        <p:spPr>
+          <a:xfrm>
+            <a:off x="848459" y="25365123"/>
+            <a:ext cx="20471150" cy="1200329"/>
+          </a:xfrm>
+          <a:prstGeom prst="rect">
+            <a:avLst/>
+          </a:prstGeom>
+          <a:noFill/>
+        </p:spPr>
+        <p:txBody>
+          <a:bodyPr wrap="square">
+            <a:spAutoFit/>
+          </a:bodyPr>
+          <a:lstStyle/>
+          <a:p>
+            <a:r>
+              <a:rPr lang="en-MY" sz="2400" dirty="0">
+                <a:latin typeface="Arial" panose="020B0604020202020204" pitchFamily="34" charset="0"/>
+                <a:cs typeface="Arial" panose="020B0604020202020204" pitchFamily="34" charset="0"/>
+              </a:rPr>
+              <a:t>To conclude, heavier load’s weight, larger spine angle, and greater number of repetitions are the 3 key factors to injury risk probability. By considering the number of repetitions of the activity allows us to identify more high-risk behaviours.</a:t>
+            </a:r>
+          </a:p>
+          <a:p>
+            <a:r>
+              <a:rPr lang="en-MY" sz="2400" dirty="0">
+                <a:latin typeface="Arial" panose="020B0604020202020204" pitchFamily="34" charset="0"/>
+                <a:cs typeface="Arial" panose="020B0604020202020204" pitchFamily="34" charset="0"/>
+              </a:rPr>
+              <a:t>Furthermore, the accuracy of the 3D pose estimation technique allows us to replace wearable-based technique such as IMU by computer vision.</a:t>
+            </a:r>
+          </a:p>
+        </p:txBody>
+      </p:sp>
+      <p:grpSp>
+        <p:nvGrpSpPr>
+          <p:cNvPr id="3278" name="Group 3277">
+            <a:extLst>
+              <a:ext uri="{FF2B5EF4-FFF2-40B4-BE49-F238E27FC236}">
+                <a16:creationId xmlns:a16="http://schemas.microsoft.com/office/drawing/2014/main" id="{19BA6B6F-620B-DC07-8DA5-29837BB14333}"/>
+              </a:ext>
+            </a:extLst>
+          </p:cNvPr>
+          <p:cNvGrpSpPr/>
+          <p:nvPr/>
+        </p:nvGrpSpPr>
+        <p:grpSpPr>
+          <a:xfrm>
+            <a:off x="1011238" y="20545141"/>
+            <a:ext cx="18267923" cy="4294831"/>
+            <a:chOff x="1066437" y="20228777"/>
+            <a:chExt cx="18267923" cy="4294831"/>
+          </a:xfrm>
+        </p:grpSpPr>
+        <p:pic>
+          <p:nvPicPr>
+            <p:cNvPr id="3262" name="Picture 3261">
+              <a:extLst>
+                <a:ext uri="{FF2B5EF4-FFF2-40B4-BE49-F238E27FC236}">
+                  <a16:creationId xmlns:a16="http://schemas.microsoft.com/office/drawing/2014/main" id="{8EC6DCAB-0ABF-76FB-510A-AA0AAA7F9907}"/>
+                </a:ext>
+              </a:extLst>
+            </p:cNvPr>
+            <p:cNvPicPr>
+              <a:picLocks noChangeAspect="1"/>
+            </p:cNvPicPr>
+            <p:nvPr/>
+          </p:nvPicPr>
+          <p:blipFill rotWithShape="1">
+            <a:blip r:embed="rId13"/>
+            <a:srcRect l="54866" t="3520" r="980"/>
+            <a:stretch/>
+          </p:blipFill>
+          <p:spPr>
+            <a:xfrm>
+              <a:off x="9037216" y="20228777"/>
+              <a:ext cx="4968552" cy="3874654"/>
+            </a:xfrm>
+            <a:prstGeom prst="rect">
+              <a:avLst/>
+            </a:prstGeom>
+          </p:spPr>
+        </p:pic>
+        <p:grpSp>
+          <p:nvGrpSpPr>
+            <p:cNvPr id="3265" name="Group 3264">
+              <a:extLst>
+                <a:ext uri="{FF2B5EF4-FFF2-40B4-BE49-F238E27FC236}">
+                  <a16:creationId xmlns:a16="http://schemas.microsoft.com/office/drawing/2014/main" id="{9B68697D-012E-CABE-C9DD-44D121AA378E}"/>
+                </a:ext>
+              </a:extLst>
+            </p:cNvPr>
+            <p:cNvGrpSpPr/>
+            <p:nvPr/>
+          </p:nvGrpSpPr>
+          <p:grpSpPr>
+            <a:xfrm>
+              <a:off x="1066437" y="20391911"/>
+              <a:ext cx="7567767" cy="3711570"/>
+              <a:chOff x="939461" y="20123999"/>
+              <a:chExt cx="7076866" cy="3470810"/>
+            </a:xfrm>
+          </p:grpSpPr>
+          <p:pic>
+            <p:nvPicPr>
+              <p:cNvPr id="3258" name="Picture 3257">
+                <a:extLst>
+                  <a:ext uri="{FF2B5EF4-FFF2-40B4-BE49-F238E27FC236}">
+                    <a16:creationId xmlns:a16="http://schemas.microsoft.com/office/drawing/2014/main" id="{F137A146-AC12-939F-B63E-D56A7E3A0B65}"/>
+                  </a:ext>
+                </a:extLst>
+              </p:cNvPr>
+              <p:cNvPicPr>
+                <a:picLocks noChangeAspect="1"/>
+              </p:cNvPicPr>
+              <p:nvPr/>
+            </p:nvPicPr>
+            <p:blipFill rotWithShape="1">
+              <a:blip r:embed="rId13"/>
+              <a:srcRect r="48257" b="25459"/>
+              <a:stretch/>
+            </p:blipFill>
+            <p:spPr>
+              <a:xfrm>
+                <a:off x="1265676" y="20123999"/>
+                <a:ext cx="6750651" cy="3470810"/>
+              </a:xfrm>
+              <a:prstGeom prst="rect">
+                <a:avLst/>
+              </a:prstGeom>
+            </p:spPr>
+          </p:pic>
+          <p:sp>
+            <p:nvSpPr>
+              <p:cNvPr id="3264" name="Oval 3263">
+                <a:extLst>
+                  <a:ext uri="{FF2B5EF4-FFF2-40B4-BE49-F238E27FC236}">
+                    <a16:creationId xmlns:a16="http://schemas.microsoft.com/office/drawing/2014/main" id="{6301E937-E552-9416-FFFF-93D8BB3ACEF9}"/>
+                  </a:ext>
+                </a:extLst>
+              </p:cNvPr>
+              <p:cNvSpPr/>
+              <p:nvPr/>
+            </p:nvSpPr>
+            <p:spPr>
+              <a:xfrm>
+                <a:off x="939461" y="20760625"/>
+                <a:ext cx="3201442" cy="343111"/>
+              </a:xfrm>
+              <a:prstGeom prst="ellipse">
+                <a:avLst/>
+              </a:prstGeom>
+              <a:noFill/>
+              <a:ln>
+                <a:solidFill>
+                  <a:srgbClr val="FF0000"/>
+                </a:solidFill>
+              </a:ln>
+            </p:spPr>
+            <p:style>
+              <a:lnRef idx="2">
+                <a:schemeClr val="accent1">
+                  <a:shade val="50000"/>
+                </a:schemeClr>
+              </a:lnRef>
+              <a:fillRef idx="1">
+                <a:schemeClr val="accent1"/>
+              </a:fillRef>
+              <a:effectRef idx="0">
+                <a:schemeClr val="accent1"/>
+              </a:effectRef>
+              <a:fontRef idx="minor">
+                <a:schemeClr val="lt1"/>
+              </a:fontRef>
+            </p:style>
+            <p:txBody>
+              <a:bodyPr rtlCol="0" anchor="ctr"/>
+              <a:lstStyle/>
+              <a:p>
+                <a:pPr algn="ctr"/>
+                <a:endParaRPr lang="en-US"/>
+              </a:p>
+            </p:txBody>
+          </p:sp>
+        </p:grpSp>
+        <p:sp>
+          <p:nvSpPr>
+            <p:cNvPr id="3266" name="Text Box 36">
+              <a:extLst>
+                <a:ext uri="{FF2B5EF4-FFF2-40B4-BE49-F238E27FC236}">
+                  <a16:creationId xmlns:a16="http://schemas.microsoft.com/office/drawing/2014/main" id="{C2194956-F003-729F-EF00-A457B0AB2429}"/>
+                </a:ext>
+              </a:extLst>
+            </p:cNvPr>
+            <p:cNvSpPr txBox="1"/>
+            <p:nvPr/>
+          </p:nvSpPr>
+          <p:spPr>
+            <a:xfrm>
+              <a:off x="4147871" y="24049714"/>
+              <a:ext cx="1151172" cy="427970"/>
+            </a:xfrm>
+            <a:prstGeom prst="rect">
+              <a:avLst/>
+            </a:prstGeom>
+            <a:noFill/>
+            <a:ln w="6350">
+              <a:noFill/>
+            </a:ln>
+          </p:spPr>
+          <p:txBody>
+            <a:bodyPr rot="0" spcFirstLastPara="0" vert="horz" wrap="square" lIns="91440" tIns="45720" rIns="91440" bIns="45720" numCol="1" spcCol="0" rtlCol="0" fromWordArt="0" anchor="t" anchorCtr="0" forceAA="0" compatLnSpc="1">
+              <a:prstTxWarp prst="textNoShape">
+                <a:avLst/>
+              </a:prstTxWarp>
+              <a:noAutofit/>
+            </a:bodyPr>
+            <a:lstStyle/>
+            <a:p>
+              <a:pPr>
+                <a:lnSpc>
+                  <a:spcPct val="107000"/>
+                </a:lnSpc>
+                <a:spcAft>
+                  <a:spcPts val="800"/>
+                </a:spcAft>
+              </a:pPr>
+              <a:r>
+                <a:rPr lang="en-MY" sz="2000" dirty="0">
+                  <a:latin typeface="Arial" panose="020B0604020202020204" pitchFamily="34" charset="0"/>
+                  <a:ea typeface="DengXian" panose="02010600030101010101" pitchFamily="2" charset="-122"/>
+                  <a:cs typeface="Arial" panose="020B0604020202020204" pitchFamily="34" charset="0"/>
+                </a:rPr>
+                <a:t>Figure 1</a:t>
+              </a:r>
+              <a:endParaRPr lang="en-US" sz="2000" dirty="0">
+                <a:effectLst/>
+                <a:latin typeface="Arial" panose="020B0604020202020204" pitchFamily="34" charset="0"/>
+                <a:ea typeface="DengXian" panose="02010600030101010101" pitchFamily="2" charset="-122"/>
+                <a:cs typeface="Arial" panose="020B0604020202020204" pitchFamily="34" charset="0"/>
+              </a:endParaRPr>
+            </a:p>
+          </p:txBody>
+        </p:sp>
+        <p:sp>
+          <p:nvSpPr>
+            <p:cNvPr id="3267" name="Text Box 36">
+              <a:extLst>
+                <a:ext uri="{FF2B5EF4-FFF2-40B4-BE49-F238E27FC236}">
+                  <a16:creationId xmlns:a16="http://schemas.microsoft.com/office/drawing/2014/main" id="{4F145810-7ED3-6B9F-5C41-C7E460B17B5A}"/>
+                </a:ext>
+              </a:extLst>
+            </p:cNvPr>
+            <p:cNvSpPr txBox="1"/>
+            <p:nvPr/>
+          </p:nvSpPr>
+          <p:spPr>
+            <a:xfrm>
+              <a:off x="11082362" y="24095638"/>
+              <a:ext cx="1151172" cy="427970"/>
+            </a:xfrm>
+            <a:prstGeom prst="rect">
+              <a:avLst/>
+            </a:prstGeom>
+            <a:noFill/>
+            <a:ln w="6350">
+              <a:noFill/>
+            </a:ln>
+          </p:spPr>
+          <p:txBody>
+            <a:bodyPr rot="0" spcFirstLastPara="0" vert="horz" wrap="square" lIns="91440" tIns="45720" rIns="91440" bIns="45720" numCol="1" spcCol="0" rtlCol="0" fromWordArt="0" anchor="t" anchorCtr="0" forceAA="0" compatLnSpc="1">
+              <a:prstTxWarp prst="textNoShape">
+                <a:avLst/>
+              </a:prstTxWarp>
+              <a:noAutofit/>
+            </a:bodyPr>
+            <a:lstStyle/>
+            <a:p>
+              <a:pPr>
+                <a:lnSpc>
+                  <a:spcPct val="107000"/>
+                </a:lnSpc>
+                <a:spcAft>
+                  <a:spcPts val="800"/>
+                </a:spcAft>
+              </a:pPr>
+              <a:r>
+                <a:rPr lang="en-MY" sz="2000" dirty="0">
+                  <a:latin typeface="Arial" panose="020B0604020202020204" pitchFamily="34" charset="0"/>
+                  <a:ea typeface="DengXian" panose="02010600030101010101" pitchFamily="2" charset="-122"/>
+                  <a:cs typeface="Arial" panose="020B0604020202020204" pitchFamily="34" charset="0"/>
+                </a:rPr>
+                <a:t>Figure 2</a:t>
+              </a:r>
+              <a:endParaRPr lang="en-US" sz="2000" dirty="0">
+                <a:effectLst/>
+                <a:latin typeface="Arial" panose="020B0604020202020204" pitchFamily="34" charset="0"/>
+                <a:ea typeface="DengXian" panose="02010600030101010101" pitchFamily="2" charset="-122"/>
+                <a:cs typeface="Arial" panose="020B0604020202020204" pitchFamily="34" charset="0"/>
+              </a:endParaRPr>
+            </a:p>
+          </p:txBody>
+        </p:sp>
+        <p:pic>
+          <p:nvPicPr>
+            <p:cNvPr id="3276" name="Picture 3275">
+              <a:extLst>
+                <a:ext uri="{FF2B5EF4-FFF2-40B4-BE49-F238E27FC236}">
+                  <a16:creationId xmlns:a16="http://schemas.microsoft.com/office/drawing/2014/main" id="{38BC105A-0523-676F-C0A1-7D501AEF729A}"/>
+                </a:ext>
+              </a:extLst>
+            </p:cNvPr>
+            <p:cNvPicPr>
+              <a:picLocks noChangeAspect="1"/>
+            </p:cNvPicPr>
+            <p:nvPr/>
+          </p:nvPicPr>
+          <p:blipFill>
+            <a:blip r:embed="rId14"/>
+            <a:stretch>
+              <a:fillRect/>
+            </a:stretch>
+          </p:blipFill>
+          <p:spPr>
+            <a:xfrm>
+              <a:off x="14365807" y="20252555"/>
+              <a:ext cx="4968553" cy="3797159"/>
+            </a:xfrm>
+            <a:prstGeom prst="rect">
+              <a:avLst/>
+            </a:prstGeom>
+          </p:spPr>
+        </p:pic>
+        <p:sp>
+          <p:nvSpPr>
+            <p:cNvPr id="3277" name="Text Box 36">
+              <a:extLst>
+                <a:ext uri="{FF2B5EF4-FFF2-40B4-BE49-F238E27FC236}">
+                  <a16:creationId xmlns:a16="http://schemas.microsoft.com/office/drawing/2014/main" id="{BB6CEB6F-326D-E7F9-CB25-232E2A2582AD}"/>
+                </a:ext>
+              </a:extLst>
+            </p:cNvPr>
+            <p:cNvSpPr txBox="1"/>
+            <p:nvPr/>
+          </p:nvSpPr>
+          <p:spPr>
+            <a:xfrm>
+              <a:off x="16453926" y="24090108"/>
+              <a:ext cx="1151172" cy="427970"/>
+            </a:xfrm>
+            <a:prstGeom prst="rect">
+              <a:avLst/>
+            </a:prstGeom>
+            <a:noFill/>
+            <a:ln w="6350">
+              <a:noFill/>
+            </a:ln>
+          </p:spPr>
+          <p:txBody>
+            <a:bodyPr rot="0" spcFirstLastPara="0" vert="horz" wrap="square" lIns="91440" tIns="45720" rIns="91440" bIns="45720" numCol="1" spcCol="0" rtlCol="0" fromWordArt="0" anchor="t" anchorCtr="0" forceAA="0" compatLnSpc="1">
+              <a:prstTxWarp prst="textNoShape">
+                <a:avLst/>
+              </a:prstTxWarp>
+              <a:noAutofit/>
+            </a:bodyPr>
+            <a:lstStyle/>
+            <a:p>
+              <a:pPr>
+                <a:lnSpc>
+                  <a:spcPct val="107000"/>
+                </a:lnSpc>
+                <a:spcAft>
+                  <a:spcPts val="800"/>
+                </a:spcAft>
+              </a:pPr>
+              <a:r>
+                <a:rPr lang="en-MY" sz="2000" dirty="0">
+                  <a:latin typeface="Arial" panose="020B0604020202020204" pitchFamily="34" charset="0"/>
+                  <a:ea typeface="DengXian" panose="02010600030101010101" pitchFamily="2" charset="-122"/>
+                  <a:cs typeface="Arial" panose="020B0604020202020204" pitchFamily="34" charset="0"/>
+                </a:rPr>
+                <a:t>Figure 3</a:t>
+              </a:r>
+              <a:endParaRPr lang="en-US" sz="2000" dirty="0">
+                <a:effectLst/>
+                <a:latin typeface="Arial" panose="020B0604020202020204" pitchFamily="34" charset="0"/>
+                <a:ea typeface="DengXian" panose="02010600030101010101" pitchFamily="2" charset="-122"/>
+                <a:cs typeface="Arial" panose="020B0604020202020204" pitchFamily="34" charset="0"/>
+              </a:endParaRPr>
+            </a:p>
+          </p:txBody>
+        </p:sp>
+      </p:grpSp>
+      <p:sp>
+        <p:nvSpPr>
+          <p:cNvPr id="3279" name="TextBox 3278">
+            <a:extLst>
+              <a:ext uri="{FF2B5EF4-FFF2-40B4-BE49-F238E27FC236}">
+                <a16:creationId xmlns:a16="http://schemas.microsoft.com/office/drawing/2014/main" id="{CCE439E2-7725-213A-A5DD-42585DBBA5E2}"/>
+              </a:ext>
+            </a:extLst>
+          </p:cNvPr>
+          <p:cNvSpPr txBox="1"/>
+          <p:nvPr/>
+        </p:nvSpPr>
+        <p:spPr>
+          <a:xfrm>
+            <a:off x="747921" y="19265739"/>
+            <a:ext cx="20471150" cy="461665"/>
+          </a:xfrm>
+          <a:prstGeom prst="rect">
+            <a:avLst/>
+          </a:prstGeom>
+          <a:noFill/>
+        </p:spPr>
+        <p:txBody>
+          <a:bodyPr wrap="square">
+            <a:spAutoFit/>
+          </a:bodyPr>
+          <a:lstStyle/>
+          <a:p>
+            <a:pPr marL="457200" indent="-457200">
+              <a:buFont typeface="+mj-lt"/>
+              <a:buAutoNum type="arabicPeriod" startAt="3"/>
+            </a:pPr>
+            <a:r>
+              <a:rPr lang="en-MY" sz="2400" dirty="0">
+                <a:latin typeface="Arial" panose="020B0604020202020204" pitchFamily="34" charset="0"/>
+                <a:cs typeface="Arial" panose="020B0604020202020204" pitchFamily="34" charset="0"/>
+              </a:rPr>
+              <a:t>By adjusting the load’s weight to 150N, we obtain the result as shown in Figure 3, apparently the risk is much higher than Figure 2. </a:t>
+            </a:r>
+          </a:p>
+        </p:txBody>
+      </p:sp>
+      <p:sp>
+        <p:nvSpPr>
+          <p:cNvPr id="3280" name="TextBox 3279">
+            <a:extLst>
+              <a:ext uri="{FF2B5EF4-FFF2-40B4-BE49-F238E27FC236}">
+                <a16:creationId xmlns:a16="http://schemas.microsoft.com/office/drawing/2014/main" id="{B33CBFE7-722D-DFB3-E8A8-23FDB42CA2DD}"/>
+              </a:ext>
+            </a:extLst>
+          </p:cNvPr>
+          <p:cNvSpPr txBox="1"/>
+          <p:nvPr/>
+        </p:nvSpPr>
+        <p:spPr>
+          <a:xfrm>
+            <a:off x="735418" y="19820507"/>
+            <a:ext cx="20471150" cy="830997"/>
+          </a:xfrm>
+          <a:prstGeom prst="rect">
+            <a:avLst/>
+          </a:prstGeom>
+          <a:noFill/>
+        </p:spPr>
+        <p:txBody>
+          <a:bodyPr wrap="square">
+            <a:spAutoFit/>
+          </a:bodyPr>
+          <a:lstStyle/>
+          <a:p>
+            <a:pPr marL="457200" indent="-457200">
+              <a:buFont typeface="+mj-lt"/>
+              <a:buAutoNum type="arabicPeriod" startAt="4"/>
+            </a:pPr>
+            <a:r>
+              <a:rPr lang="en-US" sz="2400" dirty="0">
+                <a:latin typeface="Arial" panose="020B0604020202020204" pitchFamily="34" charset="0"/>
+                <a:cs typeface="Arial" panose="020B0604020202020204" pitchFamily="34" charset="0"/>
+              </a:rPr>
+              <a:t>Lowering the back while carrying the same weight significantly increases the risk of injury (peak value of green curves represents peak low back flexion angle).</a:t>
+            </a:r>
+            <a:endParaRPr lang="en-MY" sz="2400" dirty="0">
+              <a:latin typeface="Arial" panose="020B0604020202020204" pitchFamily="34" charset="0"/>
+              <a:cs typeface="Arial" panose="020B0604020202020204" pitchFamily="34" charset="0"/>
+            </a:endParaRPr>
+          </a:p>
+        </p:txBody>
+      </p:sp>
+      <p:sp>
+        <p:nvSpPr>
+          <p:cNvPr id="3281" name="Text Box 6">
+            <a:extLst>
+              <a:ext uri="{FF2B5EF4-FFF2-40B4-BE49-F238E27FC236}">
+                <a16:creationId xmlns:a16="http://schemas.microsoft.com/office/drawing/2014/main" id="{B7991282-756F-8E99-28DC-44CF496310AF}"/>
+              </a:ext>
+            </a:extLst>
+          </p:cNvPr>
+          <p:cNvSpPr txBox="1"/>
+          <p:nvPr/>
+        </p:nvSpPr>
+        <p:spPr>
+          <a:xfrm>
+            <a:off x="1389601" y="26809985"/>
+            <a:ext cx="2319023" cy="524314"/>
+          </a:xfrm>
+          <a:prstGeom prst="rect">
+            <a:avLst/>
+          </a:prstGeom>
+          <a:noFill/>
+          <a:ln w="6350">
+            <a:noFill/>
+          </a:ln>
+        </p:spPr>
+        <p:txBody>
+          <a:bodyPr rot="0" spcFirstLastPara="0" vert="horz" wrap="square" lIns="91440" tIns="45720" rIns="91440" bIns="45720" numCol="1" spcCol="0" rtlCol="0" fromWordArt="0" anchor="t" anchorCtr="0" forceAA="0" compatLnSpc="1">
+            <a:prstTxWarp prst="textNoShape">
+              <a:avLst/>
+            </a:prstTxWarp>
+            <a:noAutofit/>
+          </a:bodyPr>
+          <a:lstStyle/>
+          <a:p>
+            <a:pPr>
+              <a:lnSpc>
+                <a:spcPct val="107000"/>
+              </a:lnSpc>
+              <a:spcAft>
+                <a:spcPts val="800"/>
+              </a:spcAft>
+            </a:pPr>
+            <a:r>
+              <a:rPr lang="en-US" altLang="zh-CN" sz="2800" b="1" dirty="0">
+                <a:effectLst/>
+                <a:latin typeface="Arial" panose="020B0604020202020204" pitchFamily="34" charset="0"/>
+                <a:ea typeface="DengXian" panose="02010600030101010101" pitchFamily="2" charset="-122"/>
+                <a:cs typeface="Arial" panose="020B0604020202020204" pitchFamily="34" charset="0"/>
+              </a:rPr>
+              <a:t>Future Work</a:t>
+            </a:r>
+            <a:endParaRPr lang="en-US" sz="2400" dirty="0">
+              <a:effectLst/>
+              <a:latin typeface="Arial" panose="020B0604020202020204" pitchFamily="34" charset="0"/>
+              <a:ea typeface="DengXian" panose="02010600030101010101" pitchFamily="2" charset="-122"/>
+              <a:cs typeface="Arial" panose="020B0604020202020204" pitchFamily="34" charset="0"/>
+            </a:endParaRPr>
+          </a:p>
+        </p:txBody>
+      </p:sp>
+      <p:sp>
+        <p:nvSpPr>
+          <p:cNvPr id="3283" name="TextBox 3282">
+            <a:extLst>
+              <a:ext uri="{FF2B5EF4-FFF2-40B4-BE49-F238E27FC236}">
+                <a16:creationId xmlns:a16="http://schemas.microsoft.com/office/drawing/2014/main" id="{90AC211B-6439-2D2E-C90B-A5D349D89D3D}"/>
+              </a:ext>
+            </a:extLst>
+          </p:cNvPr>
+          <p:cNvSpPr txBox="1"/>
+          <p:nvPr/>
+        </p:nvSpPr>
+        <p:spPr>
+          <a:xfrm>
+            <a:off x="727024" y="27453355"/>
+            <a:ext cx="20471150" cy="1569660"/>
+          </a:xfrm>
+          <a:prstGeom prst="rect">
+            <a:avLst/>
+          </a:prstGeom>
+          <a:noFill/>
+        </p:spPr>
+        <p:txBody>
+          <a:bodyPr wrap="square">
+            <a:spAutoFit/>
+          </a:bodyPr>
+          <a:lstStyle/>
+          <a:p>
+            <a:pPr marL="457200" indent="-457200">
+              <a:buFont typeface="+mj-lt"/>
+              <a:buAutoNum type="arabicPeriod"/>
+            </a:pPr>
+            <a:r>
+              <a:rPr lang="en-MY" sz="2400" dirty="0">
+                <a:latin typeface="Arial" panose="020B0604020202020204" pitchFamily="34" charset="0"/>
+                <a:cs typeface="Arial" panose="020B0604020202020204" pitchFamily="34" charset="0"/>
+              </a:rPr>
+              <a:t>Improve the deep learning model to increase the accuracy of the extracted 3D coordinates.</a:t>
+            </a:r>
+          </a:p>
+          <a:p>
+            <a:pPr marL="457200" indent="-457200">
+              <a:buFont typeface="+mj-lt"/>
+              <a:buAutoNum type="arabicPeriod"/>
+            </a:pPr>
+            <a:r>
+              <a:rPr lang="en-MY" sz="2400" dirty="0">
+                <a:latin typeface="Arial" panose="020B0604020202020204" pitchFamily="34" charset="0"/>
+                <a:cs typeface="Arial" panose="020B0604020202020204" pitchFamily="34" charset="0"/>
+              </a:rPr>
+              <a:t>We are using average muscle area of both genders at a certain range of age, this may not apply to more extreme cases in terms of body fitness. And hence, more customizable ergonomic risk assessment framework can be developed.</a:t>
+            </a:r>
+          </a:p>
+          <a:p>
+            <a:pPr marL="457200" indent="-457200">
+              <a:buFont typeface="+mj-lt"/>
+              <a:buAutoNum type="arabicPeriod"/>
+            </a:pPr>
+            <a:r>
+              <a:rPr lang="en-MY" sz="2400" dirty="0">
+                <a:latin typeface="Arial" panose="020B0604020202020204" pitchFamily="34" charset="0"/>
+                <a:cs typeface="Arial" panose="020B0604020202020204" pitchFamily="34" charset="0"/>
+              </a:rPr>
+              <a:t>The hyperparameters adjustment may be optimized further for the risk probability prediction.</a:t>
+            </a:r>
+          </a:p>
+        </p:txBody>
+      </p:sp>
+      <p:pic>
+        <p:nvPicPr>
+          <p:cNvPr id="3285" name="Picture 3284" descr="Text&#10;&#10;Description automatically generated">
+            <a:extLst>
+              <a:ext uri="{FF2B5EF4-FFF2-40B4-BE49-F238E27FC236}">
+                <a16:creationId xmlns:a16="http://schemas.microsoft.com/office/drawing/2014/main" id="{930202FB-7794-6A86-467D-205C15ED6450}"/>
+              </a:ext>
+            </a:extLst>
+          </p:cNvPr>
+          <p:cNvPicPr>
+            <a:picLocks noChangeAspect="1"/>
+          </p:cNvPicPr>
+          <p:nvPr/>
+        </p:nvPicPr>
+        <p:blipFill>
+          <a:blip r:embed="rId15">
+            <a:extLst>
+              <a:ext uri="{28A0092B-C50C-407E-A947-70E740481C1C}">
+                <a14:useLocalDpi xmlns:a14="http://schemas.microsoft.com/office/drawing/2010/main" val="0"/>
+              </a:ext>
+            </a:extLst>
+          </a:blip>
+          <a:stretch>
+            <a:fillRect/>
+          </a:stretch>
+        </p:blipFill>
+        <p:spPr>
+          <a:xfrm>
+            <a:off x="692075" y="26667279"/>
+            <a:ext cx="640285" cy="1042750"/>
+          </a:xfrm>
+          <a:prstGeom prst="rect">
+            <a:avLst/>
+          </a:prstGeom>
+        </p:spPr>
+      </p:pic>
     </p:spTree>
   </p:cSld>
   <p:clrMapOvr>
@@ -5615,12 +9585,12 @@
 </file>
 
 <file path=customXml/item1.xml><?xml version="1.0" encoding="utf-8"?>
-<p:properties xmlns:p="http://schemas.microsoft.com/office/2006/metadata/properties" xmlns:xsi="http://www.w3.org/2001/XMLSchema-instance" xmlns:pc="http://schemas.microsoft.com/office/infopath/2007/PartnerControls">
-  <documentManagement>
-    <PublishingExpirationDate xmlns="http://schemas.microsoft.com/sharepoint/v3" xsi:nil="true"/>
-    <PublishingStartDate xmlns="http://schemas.microsoft.com/sharepoint/v3" xsi:nil="true"/>
-  </documentManagement>
-</p:properties>
+<?mso-contentType ?>
+<FormTemplates xmlns="http://schemas.microsoft.com/sharepoint/v3/contenttype/forms">
+  <Display>DocumentLibraryForm</Display>
+  <Edit>DocumentLibraryForm</Edit>
+  <New>DocumentLibraryForm</New>
+</FormTemplates>
 </file>
 
 <file path=customXml/item2.xml><?xml version="1.0" encoding="utf-8"?>
@@ -5756,26 +9726,18 @@
 </file>
 
 <file path=customXml/item3.xml><?xml version="1.0" encoding="utf-8"?>
-<?mso-contentType ?>
-<FormTemplates xmlns="http://schemas.microsoft.com/sharepoint/v3/contenttype/forms">
-  <Display>DocumentLibraryForm</Display>
-  <Edit>DocumentLibraryForm</Edit>
-  <New>DocumentLibraryForm</New>
-</FormTemplates>
+<p:properties xmlns:p="http://schemas.microsoft.com/office/2006/metadata/properties" xmlns:xsi="http://www.w3.org/2001/XMLSchema-instance" xmlns:pc="http://schemas.microsoft.com/office/infopath/2007/PartnerControls">
+  <documentManagement>
+    <PublishingExpirationDate xmlns="http://schemas.microsoft.com/sharepoint/v3" xsi:nil="true"/>
+    <PublishingStartDate xmlns="http://schemas.microsoft.com/sharepoint/v3" xsi:nil="true"/>
+  </documentManagement>
+</p:properties>
 </file>
 
 <file path=customXml/itemProps1.xml><?xml version="1.0" encoding="utf-8"?>
-<ds:datastoreItem xmlns:ds="http://schemas.openxmlformats.org/officeDocument/2006/customXml" ds:itemID="{E189E708-B13C-4F36-BA33-81092694155D}">
+<ds:datastoreItem xmlns:ds="http://schemas.openxmlformats.org/officeDocument/2006/customXml" ds:itemID="{6EFD8C4A-05AF-47FA-8977-00F7A977B6F5}">
   <ds:schemaRefs>
-    <ds:schemaRef ds:uri="http://purl.org/dc/terms/"/>
-    <ds:schemaRef ds:uri="http://www.w3.org/XML/1998/namespace"/>
-    <ds:schemaRef ds:uri="http://schemas.microsoft.com/office/2006/documentManagement/types"/>
-    <ds:schemaRef ds:uri="http://schemas.microsoft.com/sharepoint/v3"/>
-    <ds:schemaRef ds:uri="http://schemas.microsoft.com/office/2006/metadata/properties"/>
-    <ds:schemaRef ds:uri="http://purl.org/dc/dcmitype/"/>
-    <ds:schemaRef ds:uri="http://purl.org/dc/elements/1.1/"/>
-    <ds:schemaRef ds:uri="http://schemas.microsoft.com/office/infopath/2007/PartnerControls"/>
-    <ds:schemaRef ds:uri="http://schemas.openxmlformats.org/package/2006/metadata/core-properties"/>
+    <ds:schemaRef ds:uri="http://schemas.microsoft.com/sharepoint/v3/contenttype/forms"/>
   </ds:schemaRefs>
 </ds:datastoreItem>
 </file>
@@ -5799,9 +9761,17 @@
 </file>
 
 <file path=customXml/itemProps3.xml><?xml version="1.0" encoding="utf-8"?>
-<ds:datastoreItem xmlns:ds="http://schemas.openxmlformats.org/officeDocument/2006/customXml" ds:itemID="{6EFD8C4A-05AF-47FA-8977-00F7A977B6F5}">
+<ds:datastoreItem xmlns:ds="http://schemas.openxmlformats.org/officeDocument/2006/customXml" ds:itemID="{E189E708-B13C-4F36-BA33-81092694155D}">
   <ds:schemaRefs>
-    <ds:schemaRef ds:uri="http://schemas.microsoft.com/sharepoint/v3/contenttype/forms"/>
+    <ds:schemaRef ds:uri="http://purl.org/dc/terms/"/>
+    <ds:schemaRef ds:uri="http://www.w3.org/XML/1998/namespace"/>
+    <ds:schemaRef ds:uri="http://schemas.microsoft.com/office/2006/documentManagement/types"/>
+    <ds:schemaRef ds:uri="http://schemas.microsoft.com/sharepoint/v3"/>
+    <ds:schemaRef ds:uri="http://schemas.microsoft.com/office/2006/metadata/properties"/>
+    <ds:schemaRef ds:uri="http://purl.org/dc/dcmitype/"/>
+    <ds:schemaRef ds:uri="http://purl.org/dc/elements/1.1/"/>
+    <ds:schemaRef ds:uri="http://schemas.microsoft.com/office/infopath/2007/PartnerControls"/>
+    <ds:schemaRef ds:uri="http://schemas.openxmlformats.org/package/2006/metadata/core-properties"/>
   </ds:schemaRefs>
 </ds:datastoreItem>
 </file>
</xml_diff>